<commit_message>
added new empty file
</commit_message>
<xml_diff>
--- a/SQL.pptx
+++ b/SQL.pptx
@@ -6,16 +6,25 @@
   </p:sldMasterIdLst>
   <p:sldIdLst>
     <p:sldId id="260" r:id="rId2"/>
-    <p:sldId id="261" r:id="rId3"/>
-    <p:sldId id="263" r:id="rId4"/>
-    <p:sldId id="262" r:id="rId5"/>
-    <p:sldId id="264" r:id="rId6"/>
-    <p:sldId id="258" r:id="rId7"/>
-    <p:sldId id="265" r:id="rId8"/>
-    <p:sldId id="259" r:id="rId9"/>
-    <p:sldId id="266" r:id="rId10"/>
-    <p:sldId id="256" r:id="rId11"/>
-    <p:sldId id="257" r:id="rId12"/>
+    <p:sldId id="275" r:id="rId3"/>
+    <p:sldId id="261" r:id="rId4"/>
+    <p:sldId id="263" r:id="rId5"/>
+    <p:sldId id="262" r:id="rId6"/>
+    <p:sldId id="264" r:id="rId7"/>
+    <p:sldId id="258" r:id="rId8"/>
+    <p:sldId id="265" r:id="rId9"/>
+    <p:sldId id="259" r:id="rId10"/>
+    <p:sldId id="266" r:id="rId11"/>
+    <p:sldId id="267" r:id="rId12"/>
+    <p:sldId id="268" r:id="rId13"/>
+    <p:sldId id="269" r:id="rId14"/>
+    <p:sldId id="270" r:id="rId15"/>
+    <p:sldId id="271" r:id="rId16"/>
+    <p:sldId id="273" r:id="rId17"/>
+    <p:sldId id="272" r:id="rId18"/>
+    <p:sldId id="274" r:id="rId19"/>
+    <p:sldId id="256" r:id="rId20"/>
+    <p:sldId id="257" r:id="rId21"/>
   </p:sldIdLst>
   <p:sldSz cx="12192000" cy="6858000"/>
   <p:notesSz cx="6858000" cy="9144000"/>
@@ -271,7 +280,7 @@
           <a:p>
             <a:fld id="{FE86B67A-C5D1-42A7-8813-A8E29C5F9829}" type="datetimeFigureOut">
               <a:rPr lang="en-IN" smtClean="0"/>
-              <a:t>21-05-2024</a:t>
+              <a:t>22-05-2024</a:t>
             </a:fld>
             <a:endParaRPr lang="en-IN"/>
           </a:p>
@@ -471,7 +480,7 @@
           <a:p>
             <a:fld id="{FE86B67A-C5D1-42A7-8813-A8E29C5F9829}" type="datetimeFigureOut">
               <a:rPr lang="en-IN" smtClean="0"/>
-              <a:t>21-05-2024</a:t>
+              <a:t>22-05-2024</a:t>
             </a:fld>
             <a:endParaRPr lang="en-IN"/>
           </a:p>
@@ -681,7 +690,7 @@
           <a:p>
             <a:fld id="{FE86B67A-C5D1-42A7-8813-A8E29C5F9829}" type="datetimeFigureOut">
               <a:rPr lang="en-IN" smtClean="0"/>
-              <a:t>21-05-2024</a:t>
+              <a:t>22-05-2024</a:t>
             </a:fld>
             <a:endParaRPr lang="en-IN"/>
           </a:p>
@@ -881,7 +890,7 @@
           <a:p>
             <a:fld id="{FE86B67A-C5D1-42A7-8813-A8E29C5F9829}" type="datetimeFigureOut">
               <a:rPr lang="en-IN" smtClean="0"/>
-              <a:t>21-05-2024</a:t>
+              <a:t>22-05-2024</a:t>
             </a:fld>
             <a:endParaRPr lang="en-IN"/>
           </a:p>
@@ -1157,7 +1166,7 @@
           <a:p>
             <a:fld id="{FE86B67A-C5D1-42A7-8813-A8E29C5F9829}" type="datetimeFigureOut">
               <a:rPr lang="en-IN" smtClean="0"/>
-              <a:t>21-05-2024</a:t>
+              <a:t>22-05-2024</a:t>
             </a:fld>
             <a:endParaRPr lang="en-IN"/>
           </a:p>
@@ -1425,7 +1434,7 @@
           <a:p>
             <a:fld id="{FE86B67A-C5D1-42A7-8813-A8E29C5F9829}" type="datetimeFigureOut">
               <a:rPr lang="en-IN" smtClean="0"/>
-              <a:t>21-05-2024</a:t>
+              <a:t>22-05-2024</a:t>
             </a:fld>
             <a:endParaRPr lang="en-IN"/>
           </a:p>
@@ -1840,7 +1849,7 @@
           <a:p>
             <a:fld id="{FE86B67A-C5D1-42A7-8813-A8E29C5F9829}" type="datetimeFigureOut">
               <a:rPr lang="en-IN" smtClean="0"/>
-              <a:t>21-05-2024</a:t>
+              <a:t>22-05-2024</a:t>
             </a:fld>
             <a:endParaRPr lang="en-IN"/>
           </a:p>
@@ -1982,7 +1991,7 @@
           <a:p>
             <a:fld id="{FE86B67A-C5D1-42A7-8813-A8E29C5F9829}" type="datetimeFigureOut">
               <a:rPr lang="en-IN" smtClean="0"/>
-              <a:t>21-05-2024</a:t>
+              <a:t>22-05-2024</a:t>
             </a:fld>
             <a:endParaRPr lang="en-IN"/>
           </a:p>
@@ -2095,7 +2104,7 @@
           <a:p>
             <a:fld id="{FE86B67A-C5D1-42A7-8813-A8E29C5F9829}" type="datetimeFigureOut">
               <a:rPr lang="en-IN" smtClean="0"/>
-              <a:t>21-05-2024</a:t>
+              <a:t>22-05-2024</a:t>
             </a:fld>
             <a:endParaRPr lang="en-IN"/>
           </a:p>
@@ -2408,7 +2417,7 @@
           <a:p>
             <a:fld id="{FE86B67A-C5D1-42A7-8813-A8E29C5F9829}" type="datetimeFigureOut">
               <a:rPr lang="en-IN" smtClean="0"/>
-              <a:t>21-05-2024</a:t>
+              <a:t>22-05-2024</a:t>
             </a:fld>
             <a:endParaRPr lang="en-IN"/>
           </a:p>
@@ -2697,7 +2706,7 @@
           <a:p>
             <a:fld id="{FE86B67A-C5D1-42A7-8813-A8E29C5F9829}" type="datetimeFigureOut">
               <a:rPr lang="en-IN" smtClean="0"/>
-              <a:t>21-05-2024</a:t>
+              <a:t>22-05-2024</a:t>
             </a:fld>
             <a:endParaRPr lang="en-IN"/>
           </a:p>
@@ -2940,7 +2949,7 @@
           <a:p>
             <a:fld id="{FE86B67A-C5D1-42A7-8813-A8E29C5F9829}" type="datetimeFigureOut">
               <a:rPr lang="en-IN" smtClean="0"/>
-              <a:t>21-05-2024</a:t>
+              <a:t>22-05-2024</a:t>
             </a:fld>
             <a:endParaRPr lang="en-IN"/>
           </a:p>
@@ -3372,14 +3381,14 @@
           <p:nvPr>
             <p:extLst>
               <p:ext uri="{D42A27DB-BD31-4B8C-83A1-F6EECF244321}">
-                <p14:modId xmlns:p14="http://schemas.microsoft.com/office/powerpoint/2010/main" val="1538499821"/>
+                <p14:modId xmlns:p14="http://schemas.microsoft.com/office/powerpoint/2010/main" val="1595857832"/>
               </p:ext>
             </p:extLst>
           </p:nvPr>
         </p:nvGraphicFramePr>
         <p:xfrm>
           <a:off x="203200" y="234474"/>
-          <a:ext cx="8128000" cy="1752600"/>
+          <a:ext cx="8128000" cy="2865120"/>
         </p:xfrm>
         <a:graphic>
           <a:graphicData uri="http://schemas.openxmlformats.org/drawingml/2006/table">
@@ -3543,6 +3552,111 @@
                   </a:ext>
                 </a:extLst>
               </a:tr>
+              <a:tr h="370840">
+                <a:tc>
+                  <a:txBody>
+                    <a:bodyPr/>
+                    <a:lstStyle/>
+                    <a:p>
+                      <a:r>
+                        <a:rPr lang="en-US" dirty="0"/>
+                        <a:t>Delete</a:t>
+                      </a:r>
+                      <a:endParaRPr lang="en-IN" dirty="0"/>
+                    </a:p>
+                  </a:txBody>
+                  <a:tcPr/>
+                </a:tc>
+                <a:tc>
+                  <a:txBody>
+                    <a:bodyPr/>
+                    <a:lstStyle/>
+                    <a:p>
+                      <a:r>
+                        <a:rPr lang="en-US" dirty="0"/>
+                        <a:t>Used to delete existing records from a table</a:t>
+                      </a:r>
+                      <a:endParaRPr lang="en-IN" dirty="0"/>
+                    </a:p>
+                  </a:txBody>
+                  <a:tcPr/>
+                </a:tc>
+                <a:extLst>
+                  <a:ext uri="{0D108BD9-81ED-4DB2-BD59-A6C34878D82A}">
+                    <a16:rowId xmlns:a16="http://schemas.microsoft.com/office/drawing/2014/main" val="928075070"/>
+                  </a:ext>
+                </a:extLst>
+              </a:tr>
+              <a:tr h="370840">
+                <a:tc>
+                  <a:txBody>
+                    <a:bodyPr/>
+                    <a:lstStyle/>
+                    <a:p>
+                      <a:r>
+                        <a:rPr lang="en-US" dirty="0"/>
+                        <a:t>Drop</a:t>
+                      </a:r>
+                      <a:endParaRPr lang="en-IN" dirty="0"/>
+                    </a:p>
+                  </a:txBody>
+                  <a:tcPr/>
+                </a:tc>
+                <a:tc>
+                  <a:txBody>
+                    <a:bodyPr/>
+                    <a:lstStyle/>
+                    <a:p>
+                      <a:r>
+                        <a:rPr lang="en-US" dirty="0"/>
+                        <a:t>Delete a table from database.</a:t>
+                      </a:r>
+                      <a:endParaRPr lang="en-IN" dirty="0"/>
+                    </a:p>
+                  </a:txBody>
+                  <a:tcPr/>
+                </a:tc>
+                <a:extLst>
+                  <a:ext uri="{0D108BD9-81ED-4DB2-BD59-A6C34878D82A}">
+                    <a16:rowId xmlns:a16="http://schemas.microsoft.com/office/drawing/2014/main" val="1926049057"/>
+                  </a:ext>
+                </a:extLst>
+              </a:tr>
+              <a:tr h="370840">
+                <a:tc>
+                  <a:txBody>
+                    <a:bodyPr/>
+                    <a:lstStyle/>
+                    <a:p>
+                      <a:r>
+                        <a:rPr lang="en-US" dirty="0"/>
+                        <a:t>Alter</a:t>
+                      </a:r>
+                      <a:endParaRPr lang="en-IN" dirty="0"/>
+                    </a:p>
+                  </a:txBody>
+                  <a:tcPr/>
+                </a:tc>
+                <a:tc>
+                  <a:txBody>
+                    <a:bodyPr/>
+                    <a:lstStyle/>
+                    <a:p>
+                      <a:r>
+                        <a:rPr lang="en-US" dirty="0"/>
+                        <a:t>Used to add, delete or modify columns in an existing table</a:t>
+                      </a:r>
+                      <a:endParaRPr lang="en-IN" dirty="0"/>
+                    </a:p>
+                  </a:txBody>
+                  <a:tcPr/>
+                </a:tc>
+                <a:extLst>
+                  <a:ext uri="{0D108BD9-81ED-4DB2-BD59-A6C34878D82A}">
+                    <a16:rowId xmlns:a16="http://schemas.microsoft.com/office/drawing/2014/main" val="3280519831"/>
+                  </a:ext>
+                </a:extLst>
+              </a:tr>
             </a:tbl>
           </a:graphicData>
         </a:graphic>
@@ -3561,6 +3675,1567 @@
 </file>
 
 <file path=ppt/slides/slide10.xml><?xml version="1.0" encoding="utf-8"?>
+<p:sld xmlns:a="http://schemas.openxmlformats.org/drawingml/2006/main" xmlns:r="http://schemas.openxmlformats.org/officeDocument/2006/relationships" xmlns:p="http://schemas.openxmlformats.org/presentationml/2006/main">
+  <p:cSld>
+    <p:spTree>
+      <p:nvGrpSpPr>
+        <p:cNvPr id="1" name=""/>
+        <p:cNvGrpSpPr/>
+        <p:nvPr/>
+      </p:nvGrpSpPr>
+      <p:grpSpPr>
+        <a:xfrm>
+          <a:off x="0" y="0"/>
+          <a:ext cx="0" cy="0"/>
+          <a:chOff x="0" y="0"/>
+          <a:chExt cx="0" cy="0"/>
+        </a:xfrm>
+      </p:grpSpPr>
+      <p:pic>
+        <p:nvPicPr>
+          <p:cNvPr id="2" name="Picture 1">
+            <a:extLst>
+              <a:ext uri="{FF2B5EF4-FFF2-40B4-BE49-F238E27FC236}">
+                <a16:creationId xmlns:a16="http://schemas.microsoft.com/office/drawing/2014/main" id="{6EBB2198-A52D-7CFB-4C07-E6BFE9CFABBA}"/>
+              </a:ext>
+            </a:extLst>
+          </p:cNvPr>
+          <p:cNvPicPr>
+            <a:picLocks noChangeAspect="1"/>
+          </p:cNvPicPr>
+          <p:nvPr/>
+        </p:nvPicPr>
+        <p:blipFill>
+          <a:blip r:embed="rId2"/>
+          <a:stretch>
+            <a:fillRect/>
+          </a:stretch>
+        </p:blipFill>
+        <p:spPr>
+          <a:xfrm>
+            <a:off x="1032520" y="164174"/>
+            <a:ext cx="2662401" cy="1757184"/>
+          </a:xfrm>
+          <a:prstGeom prst="rect">
+            <a:avLst/>
+          </a:prstGeom>
+        </p:spPr>
+      </p:pic>
+      <p:sp>
+        <p:nvSpPr>
+          <p:cNvPr id="4" name="Arrow: Right 3">
+            <a:extLst>
+              <a:ext uri="{FF2B5EF4-FFF2-40B4-BE49-F238E27FC236}">
+                <a16:creationId xmlns:a16="http://schemas.microsoft.com/office/drawing/2014/main" id="{D438B38F-1820-F21A-236D-BC4A31CBDAAF}"/>
+              </a:ext>
+            </a:extLst>
+          </p:cNvPr>
+          <p:cNvSpPr/>
+          <p:nvPr/>
+        </p:nvSpPr>
+        <p:spPr>
+          <a:xfrm>
+            <a:off x="4337179" y="534248"/>
+            <a:ext cx="3517641" cy="1017037"/>
+          </a:xfrm>
+          <a:prstGeom prst="rightArrow">
+            <a:avLst/>
+          </a:prstGeom>
+        </p:spPr>
+        <p:style>
+          <a:lnRef idx="2">
+            <a:schemeClr val="accent1">
+              <a:shade val="15000"/>
+            </a:schemeClr>
+          </a:lnRef>
+          <a:fillRef idx="1">
+            <a:schemeClr val="accent1"/>
+          </a:fillRef>
+          <a:effectRef idx="0">
+            <a:schemeClr val="accent1"/>
+          </a:effectRef>
+          <a:fontRef idx="minor">
+            <a:schemeClr val="lt1"/>
+          </a:fontRef>
+        </p:style>
+        <p:txBody>
+          <a:bodyPr rtlCol="0" anchor="ctr"/>
+          <a:lstStyle/>
+          <a:p>
+            <a:pPr algn="ctr"/>
+            <a:r>
+              <a:rPr lang="en-US" dirty="0"/>
+              <a:t>Update score of Ram to 100</a:t>
+            </a:r>
+            <a:endParaRPr lang="en-IN" dirty="0"/>
+          </a:p>
+        </p:txBody>
+      </p:sp>
+      <p:sp>
+        <p:nvSpPr>
+          <p:cNvPr id="6" name="TextBox 5">
+            <a:extLst>
+              <a:ext uri="{FF2B5EF4-FFF2-40B4-BE49-F238E27FC236}">
+                <a16:creationId xmlns:a16="http://schemas.microsoft.com/office/drawing/2014/main" id="{4350547D-2C8E-20C6-B656-83B19E84F9CC}"/>
+              </a:ext>
+            </a:extLst>
+          </p:cNvPr>
+          <p:cNvSpPr txBox="1"/>
+          <p:nvPr/>
+        </p:nvSpPr>
+        <p:spPr>
+          <a:xfrm>
+            <a:off x="8385889" y="2266080"/>
+            <a:ext cx="2586912" cy="1754326"/>
+          </a:xfrm>
+          <a:prstGeom prst="rect">
+            <a:avLst/>
+          </a:prstGeom>
+          <a:noFill/>
+        </p:spPr>
+        <p:txBody>
+          <a:bodyPr wrap="square">
+            <a:spAutoFit/>
+          </a:bodyPr>
+          <a:lstStyle/>
+          <a:p>
+            <a:r>
+              <a:rPr lang="en-IN" dirty="0"/>
+              <a:t>update 	</a:t>
+            </a:r>
+          </a:p>
+          <a:p>
+            <a:r>
+              <a:rPr lang="en-IN" dirty="0"/>
+              <a:t>	player </a:t>
+            </a:r>
+          </a:p>
+          <a:p>
+            <a:r>
+              <a:rPr lang="en-IN" dirty="0"/>
+              <a:t>set 	</a:t>
+            </a:r>
+          </a:p>
+          <a:p>
+            <a:r>
+              <a:rPr lang="en-IN" dirty="0"/>
+              <a:t>	score = 100</a:t>
+            </a:r>
+          </a:p>
+          <a:p>
+            <a:r>
+              <a:rPr lang="en-IN" dirty="0"/>
+              <a:t>WHERE 	</a:t>
+            </a:r>
+          </a:p>
+          <a:p>
+            <a:r>
+              <a:rPr lang="en-IN" dirty="0"/>
+              <a:t>	name = "Ram"; </a:t>
+            </a:r>
+          </a:p>
+        </p:txBody>
+      </p:sp>
+      <p:pic>
+        <p:nvPicPr>
+          <p:cNvPr id="8" name="Picture 7">
+            <a:extLst>
+              <a:ext uri="{FF2B5EF4-FFF2-40B4-BE49-F238E27FC236}">
+                <a16:creationId xmlns:a16="http://schemas.microsoft.com/office/drawing/2014/main" id="{549308D5-5C91-D663-BC48-7BA4043E580C}"/>
+              </a:ext>
+            </a:extLst>
+          </p:cNvPr>
+          <p:cNvPicPr>
+            <a:picLocks noChangeAspect="1"/>
+          </p:cNvPicPr>
+          <p:nvPr/>
+        </p:nvPicPr>
+        <p:blipFill>
+          <a:blip r:embed="rId3"/>
+          <a:stretch>
+            <a:fillRect/>
+          </a:stretch>
+        </p:blipFill>
+        <p:spPr>
+          <a:xfrm>
+            <a:off x="8385889" y="164174"/>
+            <a:ext cx="2426196" cy="1754326"/>
+          </a:xfrm>
+          <a:prstGeom prst="rect">
+            <a:avLst/>
+          </a:prstGeom>
+        </p:spPr>
+      </p:pic>
+    </p:spTree>
+    <p:extLst>
+      <p:ext uri="{BB962C8B-B14F-4D97-AF65-F5344CB8AC3E}">
+        <p14:creationId xmlns:p14="http://schemas.microsoft.com/office/powerpoint/2010/main" val="25921766"/>
+      </p:ext>
+    </p:extLst>
+  </p:cSld>
+  <p:clrMapOvr>
+    <a:masterClrMapping/>
+  </p:clrMapOvr>
+</p:sld>
+</file>
+
+<file path=ppt/slides/slide11.xml><?xml version="1.0" encoding="utf-8"?>
+<p:sld xmlns:a="http://schemas.openxmlformats.org/drawingml/2006/main" xmlns:r="http://schemas.openxmlformats.org/officeDocument/2006/relationships" xmlns:p="http://schemas.openxmlformats.org/presentationml/2006/main">
+  <p:cSld>
+    <p:spTree>
+      <p:nvGrpSpPr>
+        <p:cNvPr id="1" name=""/>
+        <p:cNvGrpSpPr/>
+        <p:nvPr/>
+      </p:nvGrpSpPr>
+      <p:grpSpPr>
+        <a:xfrm>
+          <a:off x="0" y="0"/>
+          <a:ext cx="0" cy="0"/>
+          <a:chOff x="0" y="0"/>
+          <a:chExt cx="0" cy="0"/>
+        </a:xfrm>
+      </p:grpSpPr>
+      <p:pic>
+        <p:nvPicPr>
+          <p:cNvPr id="5" name="Picture 4">
+            <a:extLst>
+              <a:ext uri="{FF2B5EF4-FFF2-40B4-BE49-F238E27FC236}">
+                <a16:creationId xmlns:a16="http://schemas.microsoft.com/office/drawing/2014/main" id="{B20BBC12-C8BD-4856-9F5F-6FADDDAB4223}"/>
+              </a:ext>
+            </a:extLst>
+          </p:cNvPr>
+          <p:cNvPicPr>
+            <a:picLocks noChangeAspect="1"/>
+          </p:cNvPicPr>
+          <p:nvPr/>
+        </p:nvPicPr>
+        <p:blipFill>
+          <a:blip r:embed="rId2"/>
+          <a:stretch>
+            <a:fillRect/>
+          </a:stretch>
+        </p:blipFill>
+        <p:spPr>
+          <a:xfrm>
+            <a:off x="263600" y="211481"/>
+            <a:ext cx="3517641" cy="1662567"/>
+          </a:xfrm>
+          <a:prstGeom prst="rect">
+            <a:avLst/>
+          </a:prstGeom>
+        </p:spPr>
+      </p:pic>
+      <p:sp>
+        <p:nvSpPr>
+          <p:cNvPr id="6" name="Arrow: Right 5">
+            <a:extLst>
+              <a:ext uri="{FF2B5EF4-FFF2-40B4-BE49-F238E27FC236}">
+                <a16:creationId xmlns:a16="http://schemas.microsoft.com/office/drawing/2014/main" id="{C33A0414-FE8A-68C4-4AFA-F6E829E369D9}"/>
+              </a:ext>
+            </a:extLst>
+          </p:cNvPr>
+          <p:cNvSpPr/>
+          <p:nvPr/>
+        </p:nvSpPr>
+        <p:spPr>
+          <a:xfrm>
+            <a:off x="4337179" y="534248"/>
+            <a:ext cx="3517641" cy="1017037"/>
+          </a:xfrm>
+          <a:prstGeom prst="rightArrow">
+            <a:avLst/>
+          </a:prstGeom>
+        </p:spPr>
+        <p:style>
+          <a:lnRef idx="2">
+            <a:schemeClr val="accent1">
+              <a:shade val="15000"/>
+            </a:schemeClr>
+          </a:lnRef>
+          <a:fillRef idx="1">
+            <a:schemeClr val="accent1"/>
+          </a:fillRef>
+          <a:effectRef idx="0">
+            <a:schemeClr val="accent1"/>
+          </a:effectRef>
+          <a:fontRef idx="minor">
+            <a:schemeClr val="lt1"/>
+          </a:fontRef>
+        </p:style>
+        <p:txBody>
+          <a:bodyPr rtlCol="0" anchor="ctr"/>
+          <a:lstStyle/>
+          <a:p>
+            <a:pPr algn="ctr"/>
+            <a:r>
+              <a:rPr lang="en-US" dirty="0"/>
+              <a:t>Delete Sai From Table</a:t>
+            </a:r>
+            <a:endParaRPr lang="en-IN" dirty="0"/>
+          </a:p>
+        </p:txBody>
+      </p:sp>
+      <p:pic>
+        <p:nvPicPr>
+          <p:cNvPr id="8" name="Picture 7">
+            <a:extLst>
+              <a:ext uri="{FF2B5EF4-FFF2-40B4-BE49-F238E27FC236}">
+                <a16:creationId xmlns:a16="http://schemas.microsoft.com/office/drawing/2014/main" id="{CB932141-21E4-A6F3-D2AC-9C51ED555237}"/>
+              </a:ext>
+            </a:extLst>
+          </p:cNvPr>
+          <p:cNvPicPr>
+            <a:picLocks noChangeAspect="1"/>
+          </p:cNvPicPr>
+          <p:nvPr/>
+        </p:nvPicPr>
+        <p:blipFill>
+          <a:blip r:embed="rId3"/>
+          <a:stretch>
+            <a:fillRect/>
+          </a:stretch>
+        </p:blipFill>
+        <p:spPr>
+          <a:xfrm>
+            <a:off x="8301913" y="480347"/>
+            <a:ext cx="3112563" cy="1124837"/>
+          </a:xfrm>
+          <a:prstGeom prst="rect">
+            <a:avLst/>
+          </a:prstGeom>
+        </p:spPr>
+      </p:pic>
+    </p:spTree>
+    <p:extLst>
+      <p:ext uri="{BB962C8B-B14F-4D97-AF65-F5344CB8AC3E}">
+        <p14:creationId xmlns:p14="http://schemas.microsoft.com/office/powerpoint/2010/main" val="3044512429"/>
+      </p:ext>
+    </p:extLst>
+  </p:cSld>
+  <p:clrMapOvr>
+    <a:masterClrMapping/>
+  </p:clrMapOvr>
+</p:sld>
+</file>
+
+<file path=ppt/slides/slide12.xml><?xml version="1.0" encoding="utf-8"?>
+<p:sld xmlns:a="http://schemas.openxmlformats.org/drawingml/2006/main" xmlns:r="http://schemas.openxmlformats.org/officeDocument/2006/relationships" xmlns:p="http://schemas.openxmlformats.org/presentationml/2006/main">
+  <p:cSld>
+    <p:spTree>
+      <p:nvGrpSpPr>
+        <p:cNvPr id="1" name=""/>
+        <p:cNvGrpSpPr/>
+        <p:nvPr/>
+      </p:nvGrpSpPr>
+      <p:grpSpPr>
+        <a:xfrm>
+          <a:off x="0" y="0"/>
+          <a:ext cx="0" cy="0"/>
+          <a:chOff x="0" y="0"/>
+          <a:chExt cx="0" cy="0"/>
+        </a:xfrm>
+      </p:grpSpPr>
+      <p:sp>
+        <p:nvSpPr>
+          <p:cNvPr id="3" name="TextBox 2">
+            <a:extLst>
+              <a:ext uri="{FF2B5EF4-FFF2-40B4-BE49-F238E27FC236}">
+                <a16:creationId xmlns:a16="http://schemas.microsoft.com/office/drawing/2014/main" id="{D4EDBE6D-D96B-738A-B053-8C7CF127FFD4}"/>
+              </a:ext>
+            </a:extLst>
+          </p:cNvPr>
+          <p:cNvSpPr txBox="1"/>
+          <p:nvPr/>
+        </p:nvSpPr>
+        <p:spPr>
+          <a:xfrm>
+            <a:off x="8616056" y="1984701"/>
+            <a:ext cx="2484275" cy="1200329"/>
+          </a:xfrm>
+          <a:prstGeom prst="rect">
+            <a:avLst/>
+          </a:prstGeom>
+          <a:noFill/>
+        </p:spPr>
+        <p:txBody>
+          <a:bodyPr wrap="square">
+            <a:spAutoFit/>
+          </a:bodyPr>
+          <a:lstStyle/>
+          <a:p>
+            <a:r>
+              <a:rPr lang="en-IN" dirty="0"/>
+              <a:t>DELETE FROM</a:t>
+            </a:r>
+          </a:p>
+          <a:p>
+            <a:r>
+              <a:rPr lang="en-IN" dirty="0"/>
+              <a:t> 	student </a:t>
+            </a:r>
+          </a:p>
+          <a:p>
+            <a:r>
+              <a:rPr lang="en-IN" dirty="0"/>
+              <a:t>WHERE 	</a:t>
+            </a:r>
+          </a:p>
+          <a:p>
+            <a:r>
+              <a:rPr lang="en-IN" dirty="0"/>
+              <a:t>	name = "Sai";</a:t>
+            </a:r>
+          </a:p>
+        </p:txBody>
+      </p:sp>
+      <p:pic>
+        <p:nvPicPr>
+          <p:cNvPr id="5" name="Picture 4">
+            <a:extLst>
+              <a:ext uri="{FF2B5EF4-FFF2-40B4-BE49-F238E27FC236}">
+                <a16:creationId xmlns:a16="http://schemas.microsoft.com/office/drawing/2014/main" id="{B20BBC12-C8BD-4856-9F5F-6FADDDAB4223}"/>
+              </a:ext>
+            </a:extLst>
+          </p:cNvPr>
+          <p:cNvPicPr>
+            <a:picLocks noChangeAspect="1"/>
+          </p:cNvPicPr>
+          <p:nvPr/>
+        </p:nvPicPr>
+        <p:blipFill>
+          <a:blip r:embed="rId2"/>
+          <a:stretch>
+            <a:fillRect/>
+          </a:stretch>
+        </p:blipFill>
+        <p:spPr>
+          <a:xfrm>
+            <a:off x="263600" y="211481"/>
+            <a:ext cx="3517641" cy="1662567"/>
+          </a:xfrm>
+          <a:prstGeom prst="rect">
+            <a:avLst/>
+          </a:prstGeom>
+        </p:spPr>
+      </p:pic>
+      <p:sp>
+        <p:nvSpPr>
+          <p:cNvPr id="6" name="Arrow: Right 5">
+            <a:extLst>
+              <a:ext uri="{FF2B5EF4-FFF2-40B4-BE49-F238E27FC236}">
+                <a16:creationId xmlns:a16="http://schemas.microsoft.com/office/drawing/2014/main" id="{C33A0414-FE8A-68C4-4AFA-F6E829E369D9}"/>
+              </a:ext>
+            </a:extLst>
+          </p:cNvPr>
+          <p:cNvSpPr/>
+          <p:nvPr/>
+        </p:nvSpPr>
+        <p:spPr>
+          <a:xfrm>
+            <a:off x="4337179" y="534248"/>
+            <a:ext cx="3517641" cy="1017037"/>
+          </a:xfrm>
+          <a:prstGeom prst="rightArrow">
+            <a:avLst/>
+          </a:prstGeom>
+        </p:spPr>
+        <p:style>
+          <a:lnRef idx="2">
+            <a:schemeClr val="accent1">
+              <a:shade val="15000"/>
+            </a:schemeClr>
+          </a:lnRef>
+          <a:fillRef idx="1">
+            <a:schemeClr val="accent1"/>
+          </a:fillRef>
+          <a:effectRef idx="0">
+            <a:schemeClr val="accent1"/>
+          </a:effectRef>
+          <a:fontRef idx="minor">
+            <a:schemeClr val="lt1"/>
+          </a:fontRef>
+        </p:style>
+        <p:txBody>
+          <a:bodyPr rtlCol="0" anchor="ctr"/>
+          <a:lstStyle/>
+          <a:p>
+            <a:pPr algn="ctr"/>
+            <a:r>
+              <a:rPr lang="en-US" dirty="0"/>
+              <a:t>Delete Sai From Table</a:t>
+            </a:r>
+            <a:endParaRPr lang="en-IN" dirty="0"/>
+          </a:p>
+        </p:txBody>
+      </p:sp>
+      <p:pic>
+        <p:nvPicPr>
+          <p:cNvPr id="8" name="Picture 7">
+            <a:extLst>
+              <a:ext uri="{FF2B5EF4-FFF2-40B4-BE49-F238E27FC236}">
+                <a16:creationId xmlns:a16="http://schemas.microsoft.com/office/drawing/2014/main" id="{CB932141-21E4-A6F3-D2AC-9C51ED555237}"/>
+              </a:ext>
+            </a:extLst>
+          </p:cNvPr>
+          <p:cNvPicPr>
+            <a:picLocks noChangeAspect="1"/>
+          </p:cNvPicPr>
+          <p:nvPr/>
+        </p:nvPicPr>
+        <p:blipFill>
+          <a:blip r:embed="rId3"/>
+          <a:stretch>
+            <a:fillRect/>
+          </a:stretch>
+        </p:blipFill>
+        <p:spPr>
+          <a:xfrm>
+            <a:off x="8301913" y="480347"/>
+            <a:ext cx="3112563" cy="1124837"/>
+          </a:xfrm>
+          <a:prstGeom prst="rect">
+            <a:avLst/>
+          </a:prstGeom>
+        </p:spPr>
+      </p:pic>
+    </p:spTree>
+    <p:extLst>
+      <p:ext uri="{BB962C8B-B14F-4D97-AF65-F5344CB8AC3E}">
+        <p14:creationId xmlns:p14="http://schemas.microsoft.com/office/powerpoint/2010/main" val="698427570"/>
+      </p:ext>
+    </p:extLst>
+  </p:cSld>
+  <p:clrMapOvr>
+    <a:masterClrMapping/>
+  </p:clrMapOvr>
+</p:sld>
+</file>
+
+<file path=ppt/slides/slide13.xml><?xml version="1.0" encoding="utf-8"?>
+<p:sld xmlns:a="http://schemas.openxmlformats.org/drawingml/2006/main" xmlns:r="http://schemas.openxmlformats.org/officeDocument/2006/relationships" xmlns:p="http://schemas.openxmlformats.org/presentationml/2006/main">
+  <p:cSld>
+    <p:spTree>
+      <p:nvGrpSpPr>
+        <p:cNvPr id="1" name=""/>
+        <p:cNvGrpSpPr/>
+        <p:nvPr/>
+      </p:nvGrpSpPr>
+      <p:grpSpPr>
+        <a:xfrm>
+          <a:off x="0" y="0"/>
+          <a:ext cx="0" cy="0"/>
+          <a:chOff x="0" y="0"/>
+          <a:chExt cx="0" cy="0"/>
+        </a:xfrm>
+      </p:grpSpPr>
+      <p:pic>
+        <p:nvPicPr>
+          <p:cNvPr id="3" name="Picture 2">
+            <a:extLst>
+              <a:ext uri="{FF2B5EF4-FFF2-40B4-BE49-F238E27FC236}">
+                <a16:creationId xmlns:a16="http://schemas.microsoft.com/office/drawing/2014/main" id="{84ABF4E8-8A3B-F79D-2A53-A574D7C7A3B7}"/>
+              </a:ext>
+            </a:extLst>
+          </p:cNvPr>
+          <p:cNvPicPr>
+            <a:picLocks noChangeAspect="1"/>
+          </p:cNvPicPr>
+          <p:nvPr/>
+        </p:nvPicPr>
+        <p:blipFill>
+          <a:blip r:embed="rId2"/>
+          <a:stretch>
+            <a:fillRect/>
+          </a:stretch>
+        </p:blipFill>
+        <p:spPr>
+          <a:xfrm>
+            <a:off x="350458" y="351662"/>
+            <a:ext cx="3563842" cy="1383832"/>
+          </a:xfrm>
+          <a:prstGeom prst="rect">
+            <a:avLst/>
+          </a:prstGeom>
+        </p:spPr>
+      </p:pic>
+      <p:sp>
+        <p:nvSpPr>
+          <p:cNvPr id="4" name="Arrow: Right 3">
+            <a:extLst>
+              <a:ext uri="{FF2B5EF4-FFF2-40B4-BE49-F238E27FC236}">
+                <a16:creationId xmlns:a16="http://schemas.microsoft.com/office/drawing/2014/main" id="{1EDD3182-462A-6EB0-0B7D-11C3A7A68443}"/>
+              </a:ext>
+            </a:extLst>
+          </p:cNvPr>
+          <p:cNvSpPr/>
+          <p:nvPr/>
+        </p:nvSpPr>
+        <p:spPr>
+          <a:xfrm>
+            <a:off x="4337179" y="534248"/>
+            <a:ext cx="3517641" cy="1017037"/>
+          </a:xfrm>
+          <a:prstGeom prst="rightArrow">
+            <a:avLst/>
+          </a:prstGeom>
+        </p:spPr>
+        <p:style>
+          <a:lnRef idx="2">
+            <a:schemeClr val="accent1">
+              <a:shade val="15000"/>
+            </a:schemeClr>
+          </a:lnRef>
+          <a:fillRef idx="1">
+            <a:schemeClr val="accent1"/>
+          </a:fillRef>
+          <a:effectRef idx="0">
+            <a:schemeClr val="accent1"/>
+          </a:effectRef>
+          <a:fontRef idx="minor">
+            <a:schemeClr val="lt1"/>
+          </a:fontRef>
+        </p:style>
+        <p:txBody>
+          <a:bodyPr rtlCol="0" anchor="ctr"/>
+          <a:lstStyle/>
+          <a:p>
+            <a:pPr algn="ctr"/>
+            <a:r>
+              <a:rPr lang="en-US" dirty="0"/>
+              <a:t>Add College Column </a:t>
+            </a:r>
+            <a:endParaRPr lang="en-IN" dirty="0"/>
+          </a:p>
+        </p:txBody>
+      </p:sp>
+      <p:pic>
+        <p:nvPicPr>
+          <p:cNvPr id="8" name="Picture 7">
+            <a:extLst>
+              <a:ext uri="{FF2B5EF4-FFF2-40B4-BE49-F238E27FC236}">
+                <a16:creationId xmlns:a16="http://schemas.microsoft.com/office/drawing/2014/main" id="{32A71DC8-8D14-52CD-C64F-43F6B1111957}"/>
+              </a:ext>
+            </a:extLst>
+          </p:cNvPr>
+          <p:cNvPicPr>
+            <a:picLocks noChangeAspect="1"/>
+          </p:cNvPicPr>
+          <p:nvPr/>
+        </p:nvPicPr>
+        <p:blipFill>
+          <a:blip r:embed="rId3"/>
+          <a:stretch>
+            <a:fillRect/>
+          </a:stretch>
+        </p:blipFill>
+        <p:spPr>
+          <a:xfrm>
+            <a:off x="7985304" y="470700"/>
+            <a:ext cx="3744271" cy="1057207"/>
+          </a:xfrm>
+          <a:prstGeom prst="rect">
+            <a:avLst/>
+          </a:prstGeom>
+        </p:spPr>
+      </p:pic>
+    </p:spTree>
+    <p:extLst>
+      <p:ext uri="{BB962C8B-B14F-4D97-AF65-F5344CB8AC3E}">
+        <p14:creationId xmlns:p14="http://schemas.microsoft.com/office/powerpoint/2010/main" val="3612819519"/>
+      </p:ext>
+    </p:extLst>
+  </p:cSld>
+  <p:clrMapOvr>
+    <a:masterClrMapping/>
+  </p:clrMapOvr>
+</p:sld>
+</file>
+
+<file path=ppt/slides/slide14.xml><?xml version="1.0" encoding="utf-8"?>
+<p:sld xmlns:a="http://schemas.openxmlformats.org/drawingml/2006/main" xmlns:r="http://schemas.openxmlformats.org/officeDocument/2006/relationships" xmlns:p="http://schemas.openxmlformats.org/presentationml/2006/main">
+  <p:cSld>
+    <p:spTree>
+      <p:nvGrpSpPr>
+        <p:cNvPr id="1" name=""/>
+        <p:cNvGrpSpPr/>
+        <p:nvPr/>
+      </p:nvGrpSpPr>
+      <p:grpSpPr>
+        <a:xfrm>
+          <a:off x="0" y="0"/>
+          <a:ext cx="0" cy="0"/>
+          <a:chOff x="0" y="0"/>
+          <a:chExt cx="0" cy="0"/>
+        </a:xfrm>
+      </p:grpSpPr>
+      <p:pic>
+        <p:nvPicPr>
+          <p:cNvPr id="3" name="Picture 2">
+            <a:extLst>
+              <a:ext uri="{FF2B5EF4-FFF2-40B4-BE49-F238E27FC236}">
+                <a16:creationId xmlns:a16="http://schemas.microsoft.com/office/drawing/2014/main" id="{84ABF4E8-8A3B-F79D-2A53-A574D7C7A3B7}"/>
+              </a:ext>
+            </a:extLst>
+          </p:cNvPr>
+          <p:cNvPicPr>
+            <a:picLocks noChangeAspect="1"/>
+          </p:cNvPicPr>
+          <p:nvPr/>
+        </p:nvPicPr>
+        <p:blipFill>
+          <a:blip r:embed="rId2"/>
+          <a:stretch>
+            <a:fillRect/>
+          </a:stretch>
+        </p:blipFill>
+        <p:spPr>
+          <a:xfrm>
+            <a:off x="350458" y="351662"/>
+            <a:ext cx="3563842" cy="1383832"/>
+          </a:xfrm>
+          <a:prstGeom prst="rect">
+            <a:avLst/>
+          </a:prstGeom>
+        </p:spPr>
+      </p:pic>
+      <p:sp>
+        <p:nvSpPr>
+          <p:cNvPr id="4" name="Arrow: Right 3">
+            <a:extLst>
+              <a:ext uri="{FF2B5EF4-FFF2-40B4-BE49-F238E27FC236}">
+                <a16:creationId xmlns:a16="http://schemas.microsoft.com/office/drawing/2014/main" id="{1EDD3182-462A-6EB0-0B7D-11C3A7A68443}"/>
+              </a:ext>
+            </a:extLst>
+          </p:cNvPr>
+          <p:cNvSpPr/>
+          <p:nvPr/>
+        </p:nvSpPr>
+        <p:spPr>
+          <a:xfrm>
+            <a:off x="4337179" y="534248"/>
+            <a:ext cx="3517641" cy="1017037"/>
+          </a:xfrm>
+          <a:prstGeom prst="rightArrow">
+            <a:avLst/>
+          </a:prstGeom>
+        </p:spPr>
+        <p:style>
+          <a:lnRef idx="2">
+            <a:schemeClr val="accent1">
+              <a:shade val="15000"/>
+            </a:schemeClr>
+          </a:lnRef>
+          <a:fillRef idx="1">
+            <a:schemeClr val="accent1"/>
+          </a:fillRef>
+          <a:effectRef idx="0">
+            <a:schemeClr val="accent1"/>
+          </a:effectRef>
+          <a:fontRef idx="minor">
+            <a:schemeClr val="lt1"/>
+          </a:fontRef>
+        </p:style>
+        <p:txBody>
+          <a:bodyPr rtlCol="0" anchor="ctr"/>
+          <a:lstStyle/>
+          <a:p>
+            <a:pPr algn="ctr"/>
+            <a:r>
+              <a:rPr lang="en-US" dirty="0"/>
+              <a:t>Add College Column </a:t>
+            </a:r>
+            <a:endParaRPr lang="en-IN" dirty="0"/>
+          </a:p>
+        </p:txBody>
+      </p:sp>
+      <p:sp>
+        <p:nvSpPr>
+          <p:cNvPr id="6" name="TextBox 5">
+            <a:extLst>
+              <a:ext uri="{FF2B5EF4-FFF2-40B4-BE49-F238E27FC236}">
+                <a16:creationId xmlns:a16="http://schemas.microsoft.com/office/drawing/2014/main" id="{B64E280B-431A-A968-A120-C9C9F2D9DB9B}"/>
+              </a:ext>
+            </a:extLst>
+          </p:cNvPr>
+          <p:cNvSpPr txBox="1"/>
+          <p:nvPr/>
+        </p:nvSpPr>
+        <p:spPr>
+          <a:xfrm>
+            <a:off x="8209420" y="1984701"/>
+            <a:ext cx="3296038" cy="1200329"/>
+          </a:xfrm>
+          <a:prstGeom prst="rect">
+            <a:avLst/>
+          </a:prstGeom>
+          <a:noFill/>
+        </p:spPr>
+        <p:txBody>
+          <a:bodyPr wrap="square">
+            <a:spAutoFit/>
+          </a:bodyPr>
+          <a:lstStyle/>
+          <a:p>
+            <a:r>
+              <a:rPr lang="en-IN" dirty="0"/>
+              <a:t>ALTER TABLE 	</a:t>
+            </a:r>
+          </a:p>
+          <a:p>
+            <a:r>
+              <a:rPr lang="en-IN" dirty="0"/>
+              <a:t>	student</a:t>
+            </a:r>
+          </a:p>
+          <a:p>
+            <a:r>
+              <a:rPr lang="en-IN" dirty="0"/>
+              <a:t>ADD	</a:t>
+            </a:r>
+          </a:p>
+          <a:p>
+            <a:r>
+              <a:rPr lang="en-IN" dirty="0"/>
+              <a:t>	college VARCHAR(200);</a:t>
+            </a:r>
+          </a:p>
+        </p:txBody>
+      </p:sp>
+      <p:pic>
+        <p:nvPicPr>
+          <p:cNvPr id="8" name="Picture 7">
+            <a:extLst>
+              <a:ext uri="{FF2B5EF4-FFF2-40B4-BE49-F238E27FC236}">
+                <a16:creationId xmlns:a16="http://schemas.microsoft.com/office/drawing/2014/main" id="{32A71DC8-8D14-52CD-C64F-43F6B1111957}"/>
+              </a:ext>
+            </a:extLst>
+          </p:cNvPr>
+          <p:cNvPicPr>
+            <a:picLocks noChangeAspect="1"/>
+          </p:cNvPicPr>
+          <p:nvPr/>
+        </p:nvPicPr>
+        <p:blipFill>
+          <a:blip r:embed="rId3"/>
+          <a:stretch>
+            <a:fillRect/>
+          </a:stretch>
+        </p:blipFill>
+        <p:spPr>
+          <a:xfrm>
+            <a:off x="7985304" y="470700"/>
+            <a:ext cx="3744271" cy="1057207"/>
+          </a:xfrm>
+          <a:prstGeom prst="rect">
+            <a:avLst/>
+          </a:prstGeom>
+        </p:spPr>
+      </p:pic>
+    </p:spTree>
+    <p:extLst>
+      <p:ext uri="{BB962C8B-B14F-4D97-AF65-F5344CB8AC3E}">
+        <p14:creationId xmlns:p14="http://schemas.microsoft.com/office/powerpoint/2010/main" val="3770787771"/>
+      </p:ext>
+    </p:extLst>
+  </p:cSld>
+  <p:clrMapOvr>
+    <a:masterClrMapping/>
+  </p:clrMapOvr>
+</p:sld>
+</file>
+
+<file path=ppt/slides/slide15.xml><?xml version="1.0" encoding="utf-8"?>
+<p:sld xmlns:a="http://schemas.openxmlformats.org/drawingml/2006/main" xmlns:r="http://schemas.openxmlformats.org/officeDocument/2006/relationships" xmlns:p="http://schemas.openxmlformats.org/presentationml/2006/main">
+  <p:cSld>
+    <p:spTree>
+      <p:nvGrpSpPr>
+        <p:cNvPr id="1" name=""/>
+        <p:cNvGrpSpPr/>
+        <p:nvPr/>
+      </p:nvGrpSpPr>
+      <p:grpSpPr>
+        <a:xfrm>
+          <a:off x="0" y="0"/>
+          <a:ext cx="0" cy="0"/>
+          <a:chOff x="0" y="0"/>
+          <a:chExt cx="0" cy="0"/>
+        </a:xfrm>
+      </p:grpSpPr>
+      <p:sp>
+        <p:nvSpPr>
+          <p:cNvPr id="4" name="Arrow: Right 3">
+            <a:extLst>
+              <a:ext uri="{FF2B5EF4-FFF2-40B4-BE49-F238E27FC236}">
+                <a16:creationId xmlns:a16="http://schemas.microsoft.com/office/drawing/2014/main" id="{1EDD3182-462A-6EB0-0B7D-11C3A7A68443}"/>
+              </a:ext>
+            </a:extLst>
+          </p:cNvPr>
+          <p:cNvSpPr/>
+          <p:nvPr/>
+        </p:nvSpPr>
+        <p:spPr>
+          <a:xfrm>
+            <a:off x="4337179" y="376865"/>
+            <a:ext cx="3517641" cy="1017037"/>
+          </a:xfrm>
+          <a:prstGeom prst="rightArrow">
+            <a:avLst/>
+          </a:prstGeom>
+        </p:spPr>
+        <p:style>
+          <a:lnRef idx="2">
+            <a:schemeClr val="accent1">
+              <a:shade val="15000"/>
+            </a:schemeClr>
+          </a:lnRef>
+          <a:fillRef idx="1">
+            <a:schemeClr val="accent1"/>
+          </a:fillRef>
+          <a:effectRef idx="0">
+            <a:schemeClr val="accent1"/>
+          </a:effectRef>
+          <a:fontRef idx="minor">
+            <a:schemeClr val="lt1"/>
+          </a:fontRef>
+        </p:style>
+        <p:txBody>
+          <a:bodyPr rtlCol="0" anchor="ctr"/>
+          <a:lstStyle/>
+          <a:p>
+            <a:pPr algn="ctr"/>
+            <a:r>
+              <a:rPr lang="en-US" dirty="0"/>
+              <a:t>Change score to </a:t>
+            </a:r>
+            <a:r>
+              <a:rPr lang="en-US" dirty="0" err="1"/>
+              <a:t>pscore</a:t>
+            </a:r>
+            <a:r>
+              <a:rPr lang="en-US" dirty="0"/>
+              <a:t> </a:t>
+            </a:r>
+            <a:endParaRPr lang="en-IN" dirty="0"/>
+          </a:p>
+        </p:txBody>
+      </p:sp>
+      <p:pic>
+        <p:nvPicPr>
+          <p:cNvPr id="8" name="Picture 7">
+            <a:extLst>
+              <a:ext uri="{FF2B5EF4-FFF2-40B4-BE49-F238E27FC236}">
+                <a16:creationId xmlns:a16="http://schemas.microsoft.com/office/drawing/2014/main" id="{32A71DC8-8D14-52CD-C64F-43F6B1111957}"/>
+              </a:ext>
+            </a:extLst>
+          </p:cNvPr>
+          <p:cNvPicPr>
+            <a:picLocks noChangeAspect="1"/>
+          </p:cNvPicPr>
+          <p:nvPr/>
+        </p:nvPicPr>
+        <p:blipFill>
+          <a:blip r:embed="rId2"/>
+          <a:stretch>
+            <a:fillRect/>
+          </a:stretch>
+        </p:blipFill>
+        <p:spPr>
+          <a:xfrm>
+            <a:off x="436839" y="405386"/>
+            <a:ext cx="3744271" cy="1057207"/>
+          </a:xfrm>
+          <a:prstGeom prst="rect">
+            <a:avLst/>
+          </a:prstGeom>
+        </p:spPr>
+      </p:pic>
+      <p:pic>
+        <p:nvPicPr>
+          <p:cNvPr id="7" name="Picture 6">
+            <a:extLst>
+              <a:ext uri="{FF2B5EF4-FFF2-40B4-BE49-F238E27FC236}">
+                <a16:creationId xmlns:a16="http://schemas.microsoft.com/office/drawing/2014/main" id="{A71C69F8-2B45-27D6-176A-4BDA62392E8A}"/>
+              </a:ext>
+            </a:extLst>
+          </p:cNvPr>
+          <p:cNvPicPr>
+            <a:picLocks noChangeAspect="1"/>
+          </p:cNvPicPr>
+          <p:nvPr/>
+        </p:nvPicPr>
+        <p:blipFill>
+          <a:blip r:embed="rId3"/>
+          <a:stretch>
+            <a:fillRect/>
+          </a:stretch>
+        </p:blipFill>
+        <p:spPr>
+          <a:xfrm>
+            <a:off x="8099017" y="376865"/>
+            <a:ext cx="3656144" cy="1040700"/>
+          </a:xfrm>
+          <a:prstGeom prst="rect">
+            <a:avLst/>
+          </a:prstGeom>
+        </p:spPr>
+      </p:pic>
+    </p:spTree>
+    <p:extLst>
+      <p:ext uri="{BB962C8B-B14F-4D97-AF65-F5344CB8AC3E}">
+        <p14:creationId xmlns:p14="http://schemas.microsoft.com/office/powerpoint/2010/main" val="3312532111"/>
+      </p:ext>
+    </p:extLst>
+  </p:cSld>
+  <p:clrMapOvr>
+    <a:masterClrMapping/>
+  </p:clrMapOvr>
+</p:sld>
+</file>
+
+<file path=ppt/slides/slide16.xml><?xml version="1.0" encoding="utf-8"?>
+<p:sld xmlns:a="http://schemas.openxmlformats.org/drawingml/2006/main" xmlns:r="http://schemas.openxmlformats.org/officeDocument/2006/relationships" xmlns:p="http://schemas.openxmlformats.org/presentationml/2006/main">
+  <p:cSld>
+    <p:spTree>
+      <p:nvGrpSpPr>
+        <p:cNvPr id="1" name=""/>
+        <p:cNvGrpSpPr/>
+        <p:nvPr/>
+      </p:nvGrpSpPr>
+      <p:grpSpPr>
+        <a:xfrm>
+          <a:off x="0" y="0"/>
+          <a:ext cx="0" cy="0"/>
+          <a:chOff x="0" y="0"/>
+          <a:chExt cx="0" cy="0"/>
+        </a:xfrm>
+      </p:grpSpPr>
+      <p:sp>
+        <p:nvSpPr>
+          <p:cNvPr id="4" name="Arrow: Right 3">
+            <a:extLst>
+              <a:ext uri="{FF2B5EF4-FFF2-40B4-BE49-F238E27FC236}">
+                <a16:creationId xmlns:a16="http://schemas.microsoft.com/office/drawing/2014/main" id="{1EDD3182-462A-6EB0-0B7D-11C3A7A68443}"/>
+              </a:ext>
+            </a:extLst>
+          </p:cNvPr>
+          <p:cNvSpPr/>
+          <p:nvPr/>
+        </p:nvSpPr>
+        <p:spPr>
+          <a:xfrm>
+            <a:off x="4337179" y="376865"/>
+            <a:ext cx="3517641" cy="1017037"/>
+          </a:xfrm>
+          <a:prstGeom prst="rightArrow">
+            <a:avLst/>
+          </a:prstGeom>
+        </p:spPr>
+        <p:style>
+          <a:lnRef idx="2">
+            <a:schemeClr val="accent1">
+              <a:shade val="15000"/>
+            </a:schemeClr>
+          </a:lnRef>
+          <a:fillRef idx="1">
+            <a:schemeClr val="accent1"/>
+          </a:fillRef>
+          <a:effectRef idx="0">
+            <a:schemeClr val="accent1"/>
+          </a:effectRef>
+          <a:fontRef idx="minor">
+            <a:schemeClr val="lt1"/>
+          </a:fontRef>
+        </p:style>
+        <p:txBody>
+          <a:bodyPr rtlCol="0" anchor="ctr"/>
+          <a:lstStyle/>
+          <a:p>
+            <a:pPr algn="ctr"/>
+            <a:r>
+              <a:rPr lang="en-US" dirty="0"/>
+              <a:t>Change score to </a:t>
+            </a:r>
+            <a:r>
+              <a:rPr lang="en-US" dirty="0" err="1"/>
+              <a:t>pscore</a:t>
+            </a:r>
+            <a:r>
+              <a:rPr lang="en-US" dirty="0"/>
+              <a:t> </a:t>
+            </a:r>
+            <a:endParaRPr lang="en-IN" dirty="0"/>
+          </a:p>
+        </p:txBody>
+      </p:sp>
+      <p:pic>
+        <p:nvPicPr>
+          <p:cNvPr id="8" name="Picture 7">
+            <a:extLst>
+              <a:ext uri="{FF2B5EF4-FFF2-40B4-BE49-F238E27FC236}">
+                <a16:creationId xmlns:a16="http://schemas.microsoft.com/office/drawing/2014/main" id="{32A71DC8-8D14-52CD-C64F-43F6B1111957}"/>
+              </a:ext>
+            </a:extLst>
+          </p:cNvPr>
+          <p:cNvPicPr>
+            <a:picLocks noChangeAspect="1"/>
+          </p:cNvPicPr>
+          <p:nvPr/>
+        </p:nvPicPr>
+        <p:blipFill>
+          <a:blip r:embed="rId2"/>
+          <a:stretch>
+            <a:fillRect/>
+          </a:stretch>
+        </p:blipFill>
+        <p:spPr>
+          <a:xfrm>
+            <a:off x="436839" y="405386"/>
+            <a:ext cx="3744271" cy="1057207"/>
+          </a:xfrm>
+          <a:prstGeom prst="rect">
+            <a:avLst/>
+          </a:prstGeom>
+        </p:spPr>
+      </p:pic>
+      <p:sp>
+        <p:nvSpPr>
+          <p:cNvPr id="5" name="TextBox 4">
+            <a:extLst>
+              <a:ext uri="{FF2B5EF4-FFF2-40B4-BE49-F238E27FC236}">
+                <a16:creationId xmlns:a16="http://schemas.microsoft.com/office/drawing/2014/main" id="{F9D5646F-826E-5EF5-D997-A282D13C43A3}"/>
+              </a:ext>
+            </a:extLst>
+          </p:cNvPr>
+          <p:cNvSpPr txBox="1"/>
+          <p:nvPr/>
+        </p:nvSpPr>
+        <p:spPr>
+          <a:xfrm>
+            <a:off x="8528322" y="1706243"/>
+            <a:ext cx="2797533" cy="1200329"/>
+          </a:xfrm>
+          <a:prstGeom prst="rect">
+            <a:avLst/>
+          </a:prstGeom>
+          <a:noFill/>
+        </p:spPr>
+        <p:txBody>
+          <a:bodyPr wrap="square">
+            <a:spAutoFit/>
+          </a:bodyPr>
+          <a:lstStyle/>
+          <a:p>
+            <a:r>
+              <a:rPr lang="en-IN" dirty="0"/>
+              <a:t>ALTER TABLE 	</a:t>
+            </a:r>
+          </a:p>
+          <a:p>
+            <a:r>
+              <a:rPr lang="en-IN" dirty="0"/>
+              <a:t>	student </a:t>
+            </a:r>
+          </a:p>
+          <a:p>
+            <a:r>
+              <a:rPr lang="en-IN" dirty="0"/>
+              <a:t>CHANGE COLUMN 	</a:t>
+            </a:r>
+          </a:p>
+          <a:p>
+            <a:r>
+              <a:rPr lang="en-IN" dirty="0"/>
+              <a:t>	score  </a:t>
+            </a:r>
+            <a:r>
+              <a:rPr lang="en-IN" dirty="0" err="1"/>
+              <a:t>pscore</a:t>
+            </a:r>
+            <a:r>
+              <a:rPr lang="en-IN" dirty="0"/>
+              <a:t> int;</a:t>
+            </a:r>
+          </a:p>
+        </p:txBody>
+      </p:sp>
+      <p:pic>
+        <p:nvPicPr>
+          <p:cNvPr id="7" name="Picture 6">
+            <a:extLst>
+              <a:ext uri="{FF2B5EF4-FFF2-40B4-BE49-F238E27FC236}">
+                <a16:creationId xmlns:a16="http://schemas.microsoft.com/office/drawing/2014/main" id="{A71C69F8-2B45-27D6-176A-4BDA62392E8A}"/>
+              </a:ext>
+            </a:extLst>
+          </p:cNvPr>
+          <p:cNvPicPr>
+            <a:picLocks noChangeAspect="1"/>
+          </p:cNvPicPr>
+          <p:nvPr/>
+        </p:nvPicPr>
+        <p:blipFill>
+          <a:blip r:embed="rId3"/>
+          <a:stretch>
+            <a:fillRect/>
+          </a:stretch>
+        </p:blipFill>
+        <p:spPr>
+          <a:xfrm>
+            <a:off x="8099017" y="376865"/>
+            <a:ext cx="3656144" cy="1040700"/>
+          </a:xfrm>
+          <a:prstGeom prst="rect">
+            <a:avLst/>
+          </a:prstGeom>
+        </p:spPr>
+      </p:pic>
+    </p:spTree>
+    <p:extLst>
+      <p:ext uri="{BB962C8B-B14F-4D97-AF65-F5344CB8AC3E}">
+        <p14:creationId xmlns:p14="http://schemas.microsoft.com/office/powerpoint/2010/main" val="461122329"/>
+      </p:ext>
+    </p:extLst>
+  </p:cSld>
+  <p:clrMapOvr>
+    <a:masterClrMapping/>
+  </p:clrMapOvr>
+</p:sld>
+</file>
+
+<file path=ppt/slides/slide17.xml><?xml version="1.0" encoding="utf-8"?>
+<p:sld xmlns:a="http://schemas.openxmlformats.org/drawingml/2006/main" xmlns:r="http://schemas.openxmlformats.org/officeDocument/2006/relationships" xmlns:p="http://schemas.openxmlformats.org/presentationml/2006/main">
+  <p:cSld>
+    <p:spTree>
+      <p:nvGrpSpPr>
+        <p:cNvPr id="1" name=""/>
+        <p:cNvGrpSpPr/>
+        <p:nvPr/>
+      </p:nvGrpSpPr>
+      <p:grpSpPr>
+        <a:xfrm>
+          <a:off x="0" y="0"/>
+          <a:ext cx="0" cy="0"/>
+          <a:chOff x="0" y="0"/>
+          <a:chExt cx="0" cy="0"/>
+        </a:xfrm>
+      </p:grpSpPr>
+      <p:pic>
+        <p:nvPicPr>
+          <p:cNvPr id="4" name="Picture 3">
+            <a:extLst>
+              <a:ext uri="{FF2B5EF4-FFF2-40B4-BE49-F238E27FC236}">
+                <a16:creationId xmlns:a16="http://schemas.microsoft.com/office/drawing/2014/main" id="{CF87FC7A-9586-3578-FAD0-5C9D4792FD2C}"/>
+              </a:ext>
+            </a:extLst>
+          </p:cNvPr>
+          <p:cNvPicPr>
+            <a:picLocks noChangeAspect="1"/>
+          </p:cNvPicPr>
+          <p:nvPr/>
+        </p:nvPicPr>
+        <p:blipFill>
+          <a:blip r:embed="rId2"/>
+          <a:stretch>
+            <a:fillRect/>
+          </a:stretch>
+        </p:blipFill>
+        <p:spPr>
+          <a:xfrm>
+            <a:off x="436839" y="405386"/>
+            <a:ext cx="3744271" cy="1057207"/>
+          </a:xfrm>
+          <a:prstGeom prst="rect">
+            <a:avLst/>
+          </a:prstGeom>
+        </p:spPr>
+      </p:pic>
+      <p:sp>
+        <p:nvSpPr>
+          <p:cNvPr id="5" name="Arrow: Right 4">
+            <a:extLst>
+              <a:ext uri="{FF2B5EF4-FFF2-40B4-BE49-F238E27FC236}">
+                <a16:creationId xmlns:a16="http://schemas.microsoft.com/office/drawing/2014/main" id="{7F8763B8-F224-DCC1-03E2-CB7B0790BF64}"/>
+              </a:ext>
+            </a:extLst>
+          </p:cNvPr>
+          <p:cNvSpPr/>
+          <p:nvPr/>
+        </p:nvSpPr>
+        <p:spPr>
+          <a:xfrm>
+            <a:off x="4337179" y="376865"/>
+            <a:ext cx="3517641" cy="1017037"/>
+          </a:xfrm>
+          <a:prstGeom prst="rightArrow">
+            <a:avLst/>
+          </a:prstGeom>
+        </p:spPr>
+        <p:style>
+          <a:lnRef idx="2">
+            <a:schemeClr val="accent1">
+              <a:shade val="15000"/>
+            </a:schemeClr>
+          </a:lnRef>
+          <a:fillRef idx="1">
+            <a:schemeClr val="accent1"/>
+          </a:fillRef>
+          <a:effectRef idx="0">
+            <a:schemeClr val="accent1"/>
+          </a:effectRef>
+          <a:fontRef idx="minor">
+            <a:schemeClr val="lt1"/>
+          </a:fontRef>
+        </p:style>
+        <p:txBody>
+          <a:bodyPr rtlCol="0" anchor="ctr"/>
+          <a:lstStyle/>
+          <a:p>
+            <a:pPr algn="ctr"/>
+            <a:r>
+              <a:rPr lang="en-US" dirty="0"/>
+              <a:t>Remove college column</a:t>
+            </a:r>
+            <a:endParaRPr lang="en-IN" dirty="0"/>
+          </a:p>
+        </p:txBody>
+      </p:sp>
+      <p:pic>
+        <p:nvPicPr>
+          <p:cNvPr id="9" name="Picture 8">
+            <a:extLst>
+              <a:ext uri="{FF2B5EF4-FFF2-40B4-BE49-F238E27FC236}">
+                <a16:creationId xmlns:a16="http://schemas.microsoft.com/office/drawing/2014/main" id="{42824B8D-9A0E-AC89-B68E-22EF5A61D0D2}"/>
+              </a:ext>
+            </a:extLst>
+          </p:cNvPr>
+          <p:cNvPicPr>
+            <a:picLocks noChangeAspect="1"/>
+          </p:cNvPicPr>
+          <p:nvPr/>
+        </p:nvPicPr>
+        <p:blipFill>
+          <a:blip r:embed="rId3"/>
+          <a:stretch>
+            <a:fillRect/>
+          </a:stretch>
+        </p:blipFill>
+        <p:spPr>
+          <a:xfrm>
+            <a:off x="8178840" y="273398"/>
+            <a:ext cx="3055550" cy="1085728"/>
+          </a:xfrm>
+          <a:prstGeom prst="rect">
+            <a:avLst/>
+          </a:prstGeom>
+        </p:spPr>
+      </p:pic>
+    </p:spTree>
+    <p:extLst>
+      <p:ext uri="{BB962C8B-B14F-4D97-AF65-F5344CB8AC3E}">
+        <p14:creationId xmlns:p14="http://schemas.microsoft.com/office/powerpoint/2010/main" val="3892702315"/>
+      </p:ext>
+    </p:extLst>
+  </p:cSld>
+  <p:clrMapOvr>
+    <a:masterClrMapping/>
+  </p:clrMapOvr>
+</p:sld>
+</file>
+
+<file path=ppt/slides/slide18.xml><?xml version="1.0" encoding="utf-8"?>
+<p:sld xmlns:a="http://schemas.openxmlformats.org/drawingml/2006/main" xmlns:r="http://schemas.openxmlformats.org/officeDocument/2006/relationships" xmlns:p="http://schemas.openxmlformats.org/presentationml/2006/main">
+  <p:cSld>
+    <p:spTree>
+      <p:nvGrpSpPr>
+        <p:cNvPr id="1" name=""/>
+        <p:cNvGrpSpPr/>
+        <p:nvPr/>
+      </p:nvGrpSpPr>
+      <p:grpSpPr>
+        <a:xfrm>
+          <a:off x="0" y="0"/>
+          <a:ext cx="0" cy="0"/>
+          <a:chOff x="0" y="0"/>
+          <a:chExt cx="0" cy="0"/>
+        </a:xfrm>
+      </p:grpSpPr>
+      <p:pic>
+        <p:nvPicPr>
+          <p:cNvPr id="4" name="Picture 3">
+            <a:extLst>
+              <a:ext uri="{FF2B5EF4-FFF2-40B4-BE49-F238E27FC236}">
+                <a16:creationId xmlns:a16="http://schemas.microsoft.com/office/drawing/2014/main" id="{CF87FC7A-9586-3578-FAD0-5C9D4792FD2C}"/>
+              </a:ext>
+            </a:extLst>
+          </p:cNvPr>
+          <p:cNvPicPr>
+            <a:picLocks noChangeAspect="1"/>
+          </p:cNvPicPr>
+          <p:nvPr/>
+        </p:nvPicPr>
+        <p:blipFill>
+          <a:blip r:embed="rId2"/>
+          <a:stretch>
+            <a:fillRect/>
+          </a:stretch>
+        </p:blipFill>
+        <p:spPr>
+          <a:xfrm>
+            <a:off x="436839" y="405386"/>
+            <a:ext cx="3744271" cy="1057207"/>
+          </a:xfrm>
+          <a:prstGeom prst="rect">
+            <a:avLst/>
+          </a:prstGeom>
+        </p:spPr>
+      </p:pic>
+      <p:sp>
+        <p:nvSpPr>
+          <p:cNvPr id="5" name="Arrow: Right 4">
+            <a:extLst>
+              <a:ext uri="{FF2B5EF4-FFF2-40B4-BE49-F238E27FC236}">
+                <a16:creationId xmlns:a16="http://schemas.microsoft.com/office/drawing/2014/main" id="{7F8763B8-F224-DCC1-03E2-CB7B0790BF64}"/>
+              </a:ext>
+            </a:extLst>
+          </p:cNvPr>
+          <p:cNvSpPr/>
+          <p:nvPr/>
+        </p:nvSpPr>
+        <p:spPr>
+          <a:xfrm>
+            <a:off x="4337179" y="376865"/>
+            <a:ext cx="3517641" cy="1017037"/>
+          </a:xfrm>
+          <a:prstGeom prst="rightArrow">
+            <a:avLst/>
+          </a:prstGeom>
+        </p:spPr>
+        <p:style>
+          <a:lnRef idx="2">
+            <a:schemeClr val="accent1">
+              <a:shade val="15000"/>
+            </a:schemeClr>
+          </a:lnRef>
+          <a:fillRef idx="1">
+            <a:schemeClr val="accent1"/>
+          </a:fillRef>
+          <a:effectRef idx="0">
+            <a:schemeClr val="accent1"/>
+          </a:effectRef>
+          <a:fontRef idx="minor">
+            <a:schemeClr val="lt1"/>
+          </a:fontRef>
+        </p:style>
+        <p:txBody>
+          <a:bodyPr rtlCol="0" anchor="ctr"/>
+          <a:lstStyle/>
+          <a:p>
+            <a:pPr algn="ctr"/>
+            <a:r>
+              <a:rPr lang="en-US" dirty="0"/>
+              <a:t>Remove college column</a:t>
+            </a:r>
+            <a:endParaRPr lang="en-IN" dirty="0"/>
+          </a:p>
+        </p:txBody>
+      </p:sp>
+      <p:sp>
+        <p:nvSpPr>
+          <p:cNvPr id="7" name="TextBox 6">
+            <a:extLst>
+              <a:ext uri="{FF2B5EF4-FFF2-40B4-BE49-F238E27FC236}">
+                <a16:creationId xmlns:a16="http://schemas.microsoft.com/office/drawing/2014/main" id="{9D391225-285E-BBC1-B8CB-192A10387B2C}"/>
+              </a:ext>
+            </a:extLst>
+          </p:cNvPr>
+          <p:cNvSpPr txBox="1"/>
+          <p:nvPr/>
+        </p:nvSpPr>
+        <p:spPr>
+          <a:xfrm>
+            <a:off x="8864083" y="1902186"/>
+            <a:ext cx="2202023" cy="1200329"/>
+          </a:xfrm>
+          <a:prstGeom prst="rect">
+            <a:avLst/>
+          </a:prstGeom>
+          <a:noFill/>
+        </p:spPr>
+        <p:txBody>
+          <a:bodyPr wrap="square">
+            <a:spAutoFit/>
+          </a:bodyPr>
+          <a:lstStyle/>
+          <a:p>
+            <a:r>
+              <a:rPr lang="en-IN" dirty="0"/>
+              <a:t>ALTER TABLE 	</a:t>
+            </a:r>
+          </a:p>
+          <a:p>
+            <a:r>
+              <a:rPr lang="en-IN" dirty="0"/>
+              <a:t>	student</a:t>
+            </a:r>
+          </a:p>
+          <a:p>
+            <a:r>
+              <a:rPr lang="en-IN" dirty="0"/>
+              <a:t>DROP COLUMN</a:t>
+            </a:r>
+          </a:p>
+          <a:p>
+            <a:r>
+              <a:rPr lang="en-IN" dirty="0"/>
+              <a:t>	college;</a:t>
+            </a:r>
+          </a:p>
+        </p:txBody>
+      </p:sp>
+      <p:pic>
+        <p:nvPicPr>
+          <p:cNvPr id="9" name="Picture 8">
+            <a:extLst>
+              <a:ext uri="{FF2B5EF4-FFF2-40B4-BE49-F238E27FC236}">
+                <a16:creationId xmlns:a16="http://schemas.microsoft.com/office/drawing/2014/main" id="{42824B8D-9A0E-AC89-B68E-22EF5A61D0D2}"/>
+              </a:ext>
+            </a:extLst>
+          </p:cNvPr>
+          <p:cNvPicPr>
+            <a:picLocks noChangeAspect="1"/>
+          </p:cNvPicPr>
+          <p:nvPr/>
+        </p:nvPicPr>
+        <p:blipFill>
+          <a:blip r:embed="rId3"/>
+          <a:stretch>
+            <a:fillRect/>
+          </a:stretch>
+        </p:blipFill>
+        <p:spPr>
+          <a:xfrm>
+            <a:off x="8178840" y="273398"/>
+            <a:ext cx="3055550" cy="1085728"/>
+          </a:xfrm>
+          <a:prstGeom prst="rect">
+            <a:avLst/>
+          </a:prstGeom>
+        </p:spPr>
+      </p:pic>
+    </p:spTree>
+    <p:extLst>
+      <p:ext uri="{BB962C8B-B14F-4D97-AF65-F5344CB8AC3E}">
+        <p14:creationId xmlns:p14="http://schemas.microsoft.com/office/powerpoint/2010/main" val="2818565069"/>
+      </p:ext>
+    </p:extLst>
+  </p:cSld>
+  <p:clrMapOvr>
+    <a:masterClrMapping/>
+  </p:clrMapOvr>
+</p:sld>
+</file>
+
+<file path=ppt/slides/slide19.xml><?xml version="1.0" encoding="utf-8"?>
 <p:sld xmlns:a="http://schemas.openxmlformats.org/drawingml/2006/main" xmlns:r="http://schemas.openxmlformats.org/officeDocument/2006/relationships" xmlns:p="http://schemas.openxmlformats.org/presentationml/2006/main">
   <p:cSld>
     <p:spTree>
@@ -3824,7 +5499,218 @@
 </p:sld>
 </file>
 
-<file path=ppt/slides/slide11.xml><?xml version="1.0" encoding="utf-8"?>
+<file path=ppt/slides/slide2.xml><?xml version="1.0" encoding="utf-8"?>
+<p:sld xmlns:a="http://schemas.openxmlformats.org/drawingml/2006/main" xmlns:r="http://schemas.openxmlformats.org/officeDocument/2006/relationships" xmlns:p="http://schemas.openxmlformats.org/presentationml/2006/main">
+  <p:cSld>
+    <p:spTree>
+      <p:nvGrpSpPr>
+        <p:cNvPr id="1" name=""/>
+        <p:cNvGrpSpPr/>
+        <p:nvPr/>
+      </p:nvGrpSpPr>
+      <p:grpSpPr>
+        <a:xfrm>
+          <a:off x="0" y="0"/>
+          <a:ext cx="0" cy="0"/>
+          <a:chOff x="0" y="0"/>
+          <a:chExt cx="0" cy="0"/>
+        </a:xfrm>
+      </p:grpSpPr>
+      <p:graphicFrame>
+        <p:nvGraphicFramePr>
+          <p:cNvPr id="2" name="Table 1">
+            <a:extLst>
+              <a:ext uri="{FF2B5EF4-FFF2-40B4-BE49-F238E27FC236}">
+                <a16:creationId xmlns:a16="http://schemas.microsoft.com/office/drawing/2014/main" id="{B8EC25E5-61CE-E45C-2EE8-18D0097CA2E9}"/>
+              </a:ext>
+            </a:extLst>
+          </p:cNvPr>
+          <p:cNvGraphicFramePr>
+            <a:graphicFrameLocks noGrp="1"/>
+          </p:cNvGraphicFramePr>
+          <p:nvPr>
+            <p:extLst>
+              <p:ext uri="{D42A27DB-BD31-4B8C-83A1-F6EECF244321}">
+                <p14:modId xmlns:p14="http://schemas.microsoft.com/office/powerpoint/2010/main" val="553851483"/>
+              </p:ext>
+            </p:extLst>
+          </p:nvPr>
+        </p:nvGraphicFramePr>
+        <p:xfrm>
+          <a:off x="2032000" y="719666"/>
+          <a:ext cx="8128000" cy="2204720"/>
+        </p:xfrm>
+        <a:graphic>
+          <a:graphicData uri="http://schemas.openxmlformats.org/drawingml/2006/table">
+            <a:tbl>
+              <a:tblPr firstRow="1" bandRow="1">
+                <a:tableStyleId>{5940675A-B579-460E-94D1-54222C63F5DA}</a:tableStyleId>
+              </a:tblPr>
+              <a:tblGrid>
+                <a:gridCol w="4064000">
+                  <a:extLst>
+                    <a:ext uri="{9D8B030D-6E8A-4147-A177-3AD203B41FA5}">
+                      <a16:colId xmlns:a16="http://schemas.microsoft.com/office/drawing/2014/main" val="277825555"/>
+                    </a:ext>
+                  </a:extLst>
+                </a:gridCol>
+                <a:gridCol w="4064000">
+                  <a:extLst>
+                    <a:ext uri="{9D8B030D-6E8A-4147-A177-3AD203B41FA5}">
+                      <a16:colId xmlns:a16="http://schemas.microsoft.com/office/drawing/2014/main" val="902756196"/>
+                    </a:ext>
+                  </a:extLst>
+                </a:gridCol>
+              </a:tblGrid>
+              <a:tr h="370840">
+                <a:tc gridSpan="2">
+                  <a:txBody>
+                    <a:bodyPr/>
+                    <a:lstStyle/>
+                    <a:p>
+                      <a:r>
+                        <a:rPr lang="en-US" dirty="0"/>
+                        <a:t>Difference between ALTER and UPDATE</a:t>
+                      </a:r>
+                      <a:endParaRPr lang="en-IN" dirty="0"/>
+                    </a:p>
+                  </a:txBody>
+                  <a:tcPr/>
+                </a:tc>
+                <a:tc hMerge="1">
+                  <a:txBody>
+                    <a:bodyPr/>
+                    <a:lstStyle/>
+                    <a:p>
+                      <a:endParaRPr lang="en-IN" dirty="0"/>
+                    </a:p>
+                  </a:txBody>
+                  <a:tcPr/>
+                </a:tc>
+                <a:extLst>
+                  <a:ext uri="{0D108BD9-81ED-4DB2-BD59-A6C34878D82A}">
+                    <a16:rowId xmlns:a16="http://schemas.microsoft.com/office/drawing/2014/main" val="962807588"/>
+                  </a:ext>
+                </a:extLst>
+              </a:tr>
+              <a:tr h="370840">
+                <a:tc>
+                  <a:txBody>
+                    <a:bodyPr/>
+                    <a:lstStyle/>
+                    <a:p>
+                      <a:pPr algn="ctr"/>
+                      <a:r>
+                        <a:rPr lang="en-US" dirty="0"/>
+                        <a:t>ALTER</a:t>
+                      </a:r>
+                      <a:endParaRPr lang="en-IN" dirty="0"/>
+                    </a:p>
+                  </a:txBody>
+                  <a:tcPr/>
+                </a:tc>
+                <a:tc>
+                  <a:txBody>
+                    <a:bodyPr/>
+                    <a:lstStyle/>
+                    <a:p>
+                      <a:pPr algn="ctr"/>
+                      <a:r>
+                        <a:rPr lang="en-US" dirty="0"/>
+                        <a:t>UPDATE</a:t>
+                      </a:r>
+                      <a:endParaRPr lang="en-IN" dirty="0"/>
+                    </a:p>
+                  </a:txBody>
+                  <a:tcPr/>
+                </a:tc>
+                <a:extLst>
+                  <a:ext uri="{0D108BD9-81ED-4DB2-BD59-A6C34878D82A}">
+                    <a16:rowId xmlns:a16="http://schemas.microsoft.com/office/drawing/2014/main" val="1570738592"/>
+                  </a:ext>
+                </a:extLst>
+              </a:tr>
+              <a:tr h="370840">
+                <a:tc>
+                  <a:txBody>
+                    <a:bodyPr/>
+                    <a:lstStyle/>
+                    <a:p>
+                      <a:pPr marL="285750" indent="-285750">
+                        <a:buFontTx/>
+                        <a:buChar char="-"/>
+                      </a:pPr>
+                      <a:r>
+                        <a:rPr lang="en-US" dirty="0"/>
+                        <a:t>Modify the structure of database such as adding, modifying or dropping columns, constraints or indexes. </a:t>
+                      </a:r>
+                    </a:p>
+                    <a:p>
+                      <a:pPr marL="285750" indent="-285750">
+                        <a:buFontTx/>
+                        <a:buChar char="-"/>
+                      </a:pPr>
+                      <a:r>
+                        <a:rPr lang="en-US" dirty="0"/>
+                        <a:t>Primarily used for making structural changes to database schema</a:t>
+                      </a:r>
+                      <a:endParaRPr lang="en-IN" dirty="0"/>
+                    </a:p>
+                  </a:txBody>
+                  <a:tcPr/>
+                </a:tc>
+                <a:tc>
+                  <a:txBody>
+                    <a:bodyPr/>
+                    <a:lstStyle/>
+                    <a:p>
+                      <a:pPr marL="285750" indent="-285750">
+                        <a:buFontTx/>
+                        <a:buChar char="-"/>
+                      </a:pPr>
+                      <a:r>
+                        <a:rPr lang="en-US" dirty="0"/>
+                        <a:t>Modifying existing records with in a table. </a:t>
+                      </a:r>
+                    </a:p>
+                    <a:p>
+                      <a:pPr marL="285750" indent="-285750">
+                        <a:buFontTx/>
+                        <a:buChar char="-"/>
+                      </a:pPr>
+                      <a:r>
+                        <a:rPr lang="en-US" dirty="0"/>
+                        <a:t>It is used to change the values of specific columns in one or more rows of a table. </a:t>
+                      </a:r>
+                      <a:endParaRPr lang="en-IN" dirty="0"/>
+                    </a:p>
+                  </a:txBody>
+                  <a:tcPr/>
+                </a:tc>
+                <a:extLst>
+                  <a:ext uri="{0D108BD9-81ED-4DB2-BD59-A6C34878D82A}">
+                    <a16:rowId xmlns:a16="http://schemas.microsoft.com/office/drawing/2014/main" val="9571425"/>
+                  </a:ext>
+                </a:extLst>
+              </a:tr>
+            </a:tbl>
+          </a:graphicData>
+        </a:graphic>
+      </p:graphicFrame>
+    </p:spTree>
+    <p:extLst>
+      <p:ext uri="{BB962C8B-B14F-4D97-AF65-F5344CB8AC3E}">
+        <p14:creationId xmlns:p14="http://schemas.microsoft.com/office/powerpoint/2010/main" val="1054027579"/>
+      </p:ext>
+    </p:extLst>
+  </p:cSld>
+  <p:clrMapOvr>
+    <a:masterClrMapping/>
+  </p:clrMapOvr>
+</p:sld>
+</file>
+
+<file path=ppt/slides/slide20.xml><?xml version="1.0" encoding="utf-8"?>
 <p:sld xmlns:a="http://schemas.openxmlformats.org/drawingml/2006/main" xmlns:r="http://schemas.openxmlformats.org/officeDocument/2006/relationships" xmlns:p="http://schemas.openxmlformats.org/presentationml/2006/main">
   <p:cSld>
     <p:spTree>
@@ -3989,178 +5875,6 @@
 </p:sld>
 </file>
 
-<file path=ppt/slides/slide2.xml><?xml version="1.0" encoding="utf-8"?>
-<p:sld xmlns:a="http://schemas.openxmlformats.org/drawingml/2006/main" xmlns:r="http://schemas.openxmlformats.org/officeDocument/2006/relationships" xmlns:p="http://schemas.openxmlformats.org/presentationml/2006/main">
-  <p:cSld>
-    <p:spTree>
-      <p:nvGrpSpPr>
-        <p:cNvPr id="1" name=""/>
-        <p:cNvGrpSpPr/>
-        <p:nvPr/>
-      </p:nvGrpSpPr>
-      <p:grpSpPr>
-        <a:xfrm>
-          <a:off x="0" y="0"/>
-          <a:ext cx="0" cy="0"/>
-          <a:chOff x="0" y="0"/>
-          <a:chExt cx="0" cy="0"/>
-        </a:xfrm>
-      </p:grpSpPr>
-      <p:sp>
-        <p:nvSpPr>
-          <p:cNvPr id="2" name="TextBox 1">
-            <a:extLst>
-              <a:ext uri="{FF2B5EF4-FFF2-40B4-BE49-F238E27FC236}">
-                <a16:creationId xmlns:a16="http://schemas.microsoft.com/office/drawing/2014/main" id="{41DC1E70-BFDE-2386-597C-91BEF0FD0F98}"/>
-              </a:ext>
-            </a:extLst>
-          </p:cNvPr>
-          <p:cNvSpPr txBox="1"/>
-          <p:nvPr/>
-        </p:nvSpPr>
-        <p:spPr>
-          <a:xfrm>
-            <a:off x="167951" y="242596"/>
-            <a:ext cx="5563190" cy="369332"/>
-          </a:xfrm>
-          <a:prstGeom prst="rect">
-            <a:avLst/>
-          </a:prstGeom>
-          <a:noFill/>
-        </p:spPr>
-        <p:txBody>
-          <a:bodyPr wrap="none" rtlCol="0">
-            <a:spAutoFit/>
-          </a:bodyPr>
-          <a:lstStyle/>
-          <a:p>
-            <a:r>
-              <a:rPr lang="en-US" dirty="0"/>
-              <a:t>Task: Create a student table to store the following details</a:t>
-            </a:r>
-            <a:endParaRPr lang="en-IN" dirty="0"/>
-          </a:p>
-        </p:txBody>
-      </p:sp>
-      <p:pic>
-        <p:nvPicPr>
-          <p:cNvPr id="6" name="Picture 5">
-            <a:extLst>
-              <a:ext uri="{FF2B5EF4-FFF2-40B4-BE49-F238E27FC236}">
-                <a16:creationId xmlns:a16="http://schemas.microsoft.com/office/drawing/2014/main" id="{E396FA7E-248F-3D24-3439-748C82DD74F8}"/>
-              </a:ext>
-            </a:extLst>
-          </p:cNvPr>
-          <p:cNvPicPr>
-            <a:picLocks noChangeAspect="1"/>
-          </p:cNvPicPr>
-          <p:nvPr/>
-        </p:nvPicPr>
-        <p:blipFill>
-          <a:blip r:embed="rId2"/>
-          <a:stretch>
-            <a:fillRect/>
-          </a:stretch>
-        </p:blipFill>
-        <p:spPr>
-          <a:xfrm>
-            <a:off x="7445533" y="1538843"/>
-            <a:ext cx="3288810" cy="369332"/>
-          </a:xfrm>
-          <a:prstGeom prst="rect">
-            <a:avLst/>
-          </a:prstGeom>
-        </p:spPr>
-      </p:pic>
-      <p:pic>
-        <p:nvPicPr>
-          <p:cNvPr id="8" name="Picture 7">
-            <a:extLst>
-              <a:ext uri="{FF2B5EF4-FFF2-40B4-BE49-F238E27FC236}">
-                <a16:creationId xmlns:a16="http://schemas.microsoft.com/office/drawing/2014/main" id="{C8637D5B-0012-CC97-1C50-7922A1C3C779}"/>
-              </a:ext>
-            </a:extLst>
-          </p:cNvPr>
-          <p:cNvPicPr>
-            <a:picLocks noChangeAspect="1"/>
-          </p:cNvPicPr>
-          <p:nvPr/>
-        </p:nvPicPr>
-        <p:blipFill>
-          <a:blip r:embed="rId3"/>
-          <a:stretch>
-            <a:fillRect/>
-          </a:stretch>
-        </p:blipFill>
-        <p:spPr>
-          <a:xfrm>
-            <a:off x="211679" y="1101946"/>
-            <a:ext cx="3557888" cy="2089035"/>
-          </a:xfrm>
-          <a:prstGeom prst="rect">
-            <a:avLst/>
-          </a:prstGeom>
-        </p:spPr>
-      </p:pic>
-      <p:sp>
-        <p:nvSpPr>
-          <p:cNvPr id="11" name="Arrow: Right 10">
-            <a:extLst>
-              <a:ext uri="{FF2B5EF4-FFF2-40B4-BE49-F238E27FC236}">
-                <a16:creationId xmlns:a16="http://schemas.microsoft.com/office/drawing/2014/main" id="{E3B635EE-ED2D-3BBE-635B-7A79732550C7}"/>
-              </a:ext>
-            </a:extLst>
-          </p:cNvPr>
-          <p:cNvSpPr/>
-          <p:nvPr/>
-        </p:nvSpPr>
-        <p:spPr>
-          <a:xfrm>
-            <a:off x="4085642" y="1363843"/>
-            <a:ext cx="3517641" cy="1017037"/>
-          </a:xfrm>
-          <a:prstGeom prst="rightArrow">
-            <a:avLst/>
-          </a:prstGeom>
-        </p:spPr>
-        <p:style>
-          <a:lnRef idx="2">
-            <a:schemeClr val="accent1">
-              <a:shade val="15000"/>
-            </a:schemeClr>
-          </a:lnRef>
-          <a:fillRef idx="1">
-            <a:schemeClr val="accent1"/>
-          </a:fillRef>
-          <a:effectRef idx="0">
-            <a:schemeClr val="accent1"/>
-          </a:effectRef>
-          <a:fontRef idx="minor">
-            <a:schemeClr val="lt1"/>
-          </a:fontRef>
-        </p:style>
-        <p:txBody>
-          <a:bodyPr rtlCol="0" anchor="ctr"/>
-          <a:lstStyle/>
-          <a:p>
-            <a:pPr algn="ctr"/>
-            <a:endParaRPr lang="en-IN" dirty="0"/>
-          </a:p>
-        </p:txBody>
-      </p:sp>
-    </p:spTree>
-    <p:extLst>
-      <p:ext uri="{BB962C8B-B14F-4D97-AF65-F5344CB8AC3E}">
-        <p14:creationId xmlns:p14="http://schemas.microsoft.com/office/powerpoint/2010/main" val="3585563696"/>
-      </p:ext>
-    </p:extLst>
-  </p:cSld>
-  <p:clrMapOvr>
-    <a:masterClrMapping/>
-  </p:clrMapOvr>
-</p:sld>
-</file>
-
 <file path=ppt/slides/slide3.xml><?xml version="1.0" encoding="utf-8"?>
 <p:sld xmlns:a="http://schemas.openxmlformats.org/drawingml/2006/main" xmlns:r="http://schemas.openxmlformats.org/officeDocument/2006/relationships" xmlns:p="http://schemas.openxmlformats.org/presentationml/2006/main">
   <p:cSld>
@@ -4193,7 +5907,7 @@
         <p:spPr>
           <a:xfrm>
             <a:off x="167951" y="242596"/>
-            <a:ext cx="4993931" cy="369332"/>
+            <a:ext cx="5563190" cy="369332"/>
           </a:xfrm>
           <a:prstGeom prst="rect">
             <a:avLst/>
@@ -4208,74 +5922,9 @@
           <a:p>
             <a:r>
               <a:rPr lang="en-US" dirty="0"/>
-              <a:t>Create a student table to store the following details</a:t>
+              <a:t>Task: Create a student table to store the following details</a:t>
             </a:r>
             <a:endParaRPr lang="en-IN" dirty="0"/>
-          </a:p>
-        </p:txBody>
-      </p:sp>
-      <p:sp>
-        <p:nvSpPr>
-          <p:cNvPr id="4" name="TextBox 3">
-            <a:extLst>
-              <a:ext uri="{FF2B5EF4-FFF2-40B4-BE49-F238E27FC236}">
-                <a16:creationId xmlns:a16="http://schemas.microsoft.com/office/drawing/2014/main" id="{25945B5F-24F5-1846-5AC3-DF58F03B94B3}"/>
-              </a:ext>
-            </a:extLst>
-          </p:cNvPr>
-          <p:cNvSpPr txBox="1"/>
-          <p:nvPr/>
-        </p:nvSpPr>
-        <p:spPr>
-          <a:xfrm>
-            <a:off x="7919358" y="2380880"/>
-            <a:ext cx="3949181" cy="1754326"/>
-          </a:xfrm>
-          <a:prstGeom prst="rect">
-            <a:avLst/>
-          </a:prstGeom>
-          <a:noFill/>
-        </p:spPr>
-        <p:txBody>
-          <a:bodyPr wrap="square">
-            <a:spAutoFit/>
-          </a:bodyPr>
-          <a:lstStyle/>
-          <a:p>
-            <a:r>
-              <a:rPr lang="en-IN" dirty="0"/>
-              <a:t>create table student</a:t>
-            </a:r>
-          </a:p>
-          <a:p>
-            <a:r>
-              <a:rPr lang="en-IN" dirty="0"/>
-              <a:t>(</a:t>
-            </a:r>
-          </a:p>
-          <a:p>
-            <a:r>
-              <a:rPr lang="en-IN" dirty="0"/>
-              <a:t>	name VARCHAR(200),	</a:t>
-            </a:r>
-          </a:p>
-          <a:p>
-            <a:r>
-              <a:rPr lang="en-IN" dirty="0"/>
-              <a:t>	age INT,	</a:t>
-            </a:r>
-          </a:p>
-          <a:p>
-            <a:r>
-              <a:rPr lang="en-IN" dirty="0"/>
-              <a:t>	score INT</a:t>
-            </a:r>
-          </a:p>
-          <a:p>
-            <a:r>
-              <a:rPr lang="en-IN" dirty="0"/>
-              <a:t>);</a:t>
-            </a:r>
           </a:p>
         </p:txBody>
       </p:sp>
@@ -4388,7 +6037,7 @@
     </p:spTree>
     <p:extLst>
       <p:ext uri="{BB962C8B-B14F-4D97-AF65-F5344CB8AC3E}">
-        <p14:creationId xmlns:p14="http://schemas.microsoft.com/office/powerpoint/2010/main" val="523028960"/>
+        <p14:creationId xmlns:p14="http://schemas.microsoft.com/office/powerpoint/2010/main" val="3585563696"/>
       </p:ext>
     </p:extLst>
   </p:cSld>
@@ -4415,12 +6064,113 @@
           <a:chExt cx="0" cy="0"/>
         </a:xfrm>
       </p:grpSpPr>
+      <p:sp>
+        <p:nvSpPr>
+          <p:cNvPr id="2" name="TextBox 1">
+            <a:extLst>
+              <a:ext uri="{FF2B5EF4-FFF2-40B4-BE49-F238E27FC236}">
+                <a16:creationId xmlns:a16="http://schemas.microsoft.com/office/drawing/2014/main" id="{41DC1E70-BFDE-2386-597C-91BEF0FD0F98}"/>
+              </a:ext>
+            </a:extLst>
+          </p:cNvPr>
+          <p:cNvSpPr txBox="1"/>
+          <p:nvPr/>
+        </p:nvSpPr>
+        <p:spPr>
+          <a:xfrm>
+            <a:off x="167951" y="242596"/>
+            <a:ext cx="4993931" cy="369332"/>
+          </a:xfrm>
+          <a:prstGeom prst="rect">
+            <a:avLst/>
+          </a:prstGeom>
+          <a:noFill/>
+        </p:spPr>
+        <p:txBody>
+          <a:bodyPr wrap="none" rtlCol="0">
+            <a:spAutoFit/>
+          </a:bodyPr>
+          <a:lstStyle/>
+          <a:p>
+            <a:r>
+              <a:rPr lang="en-US" dirty="0"/>
+              <a:t>Create a student table to store the following details</a:t>
+            </a:r>
+            <a:endParaRPr lang="en-IN" dirty="0"/>
+          </a:p>
+        </p:txBody>
+      </p:sp>
+      <p:sp>
+        <p:nvSpPr>
+          <p:cNvPr id="4" name="TextBox 3">
+            <a:extLst>
+              <a:ext uri="{FF2B5EF4-FFF2-40B4-BE49-F238E27FC236}">
+                <a16:creationId xmlns:a16="http://schemas.microsoft.com/office/drawing/2014/main" id="{25945B5F-24F5-1846-5AC3-DF58F03B94B3}"/>
+              </a:ext>
+            </a:extLst>
+          </p:cNvPr>
+          <p:cNvSpPr txBox="1"/>
+          <p:nvPr/>
+        </p:nvSpPr>
+        <p:spPr>
+          <a:xfrm>
+            <a:off x="7919358" y="2380880"/>
+            <a:ext cx="3949181" cy="1754326"/>
+          </a:xfrm>
+          <a:prstGeom prst="rect">
+            <a:avLst/>
+          </a:prstGeom>
+          <a:noFill/>
+        </p:spPr>
+        <p:txBody>
+          <a:bodyPr wrap="square">
+            <a:spAutoFit/>
+          </a:bodyPr>
+          <a:lstStyle/>
+          <a:p>
+            <a:r>
+              <a:rPr lang="en-IN" dirty="0"/>
+              <a:t>create table student</a:t>
+            </a:r>
+          </a:p>
+          <a:p>
+            <a:r>
+              <a:rPr lang="en-IN" dirty="0"/>
+              <a:t>(</a:t>
+            </a:r>
+          </a:p>
+          <a:p>
+            <a:r>
+              <a:rPr lang="en-IN" dirty="0"/>
+              <a:t>	name VARCHAR(200),	</a:t>
+            </a:r>
+          </a:p>
+          <a:p>
+            <a:r>
+              <a:rPr lang="en-IN" dirty="0"/>
+              <a:t>	age INT,	</a:t>
+            </a:r>
+          </a:p>
+          <a:p>
+            <a:r>
+              <a:rPr lang="en-IN" dirty="0"/>
+              <a:t>	score INT</a:t>
+            </a:r>
+          </a:p>
+          <a:p>
+            <a:r>
+              <a:rPr lang="en-IN" dirty="0"/>
+              <a:t>);</a:t>
+            </a:r>
+          </a:p>
+        </p:txBody>
+      </p:sp>
       <p:pic>
         <p:nvPicPr>
-          <p:cNvPr id="5" name="Picture 4">
-            <a:extLst>
-              <a:ext uri="{FF2B5EF4-FFF2-40B4-BE49-F238E27FC236}">
-                <a16:creationId xmlns:a16="http://schemas.microsoft.com/office/drawing/2014/main" id="{9C8AD411-1B79-DCF7-4DE3-6605C3CA9FA1}"/>
+          <p:cNvPr id="6" name="Picture 5">
+            <a:extLst>
+              <a:ext uri="{FF2B5EF4-FFF2-40B4-BE49-F238E27FC236}">
+                <a16:creationId xmlns:a16="http://schemas.microsoft.com/office/drawing/2014/main" id="{E396FA7E-248F-3D24-3439-748C82DD74F8}"/>
               </a:ext>
             </a:extLst>
           </p:cNvPr>
@@ -4437,20 +6187,50 @@
         </p:blipFill>
         <p:spPr>
           <a:xfrm>
-            <a:off x="380159" y="1121997"/>
-            <a:ext cx="2978861" cy="470347"/>
+            <a:off x="7445533" y="1538843"/>
+            <a:ext cx="3288810" cy="369332"/>
           </a:xfrm>
           <a:prstGeom prst="rect">
             <a:avLst/>
           </a:prstGeom>
         </p:spPr>
       </p:pic>
-      <p:sp>
-        <p:nvSpPr>
-          <p:cNvPr id="8" name="Arrow: Right 7">
-            <a:extLst>
-              <a:ext uri="{FF2B5EF4-FFF2-40B4-BE49-F238E27FC236}">
-                <a16:creationId xmlns:a16="http://schemas.microsoft.com/office/drawing/2014/main" id="{00E08D3F-64A2-C086-A9EB-035A93012232}"/>
+      <p:pic>
+        <p:nvPicPr>
+          <p:cNvPr id="8" name="Picture 7">
+            <a:extLst>
+              <a:ext uri="{FF2B5EF4-FFF2-40B4-BE49-F238E27FC236}">
+                <a16:creationId xmlns:a16="http://schemas.microsoft.com/office/drawing/2014/main" id="{C8637D5B-0012-CC97-1C50-7922A1C3C779}"/>
+              </a:ext>
+            </a:extLst>
+          </p:cNvPr>
+          <p:cNvPicPr>
+            <a:picLocks noChangeAspect="1"/>
+          </p:cNvPicPr>
+          <p:nvPr/>
+        </p:nvPicPr>
+        <p:blipFill>
+          <a:blip r:embed="rId3"/>
+          <a:stretch>
+            <a:fillRect/>
+          </a:stretch>
+        </p:blipFill>
+        <p:spPr>
+          <a:xfrm>
+            <a:off x="211679" y="1101946"/>
+            <a:ext cx="3557888" cy="2089035"/>
+          </a:xfrm>
+          <a:prstGeom prst="rect">
+            <a:avLst/>
+          </a:prstGeom>
+        </p:spPr>
+      </p:pic>
+      <p:sp>
+        <p:nvSpPr>
+          <p:cNvPr id="11" name="Arrow: Right 10">
+            <a:extLst>
+              <a:ext uri="{FF2B5EF4-FFF2-40B4-BE49-F238E27FC236}">
+                <a16:creationId xmlns:a16="http://schemas.microsoft.com/office/drawing/2014/main" id="{E3B635EE-ED2D-3BBE-635B-7A79732550C7}"/>
               </a:ext>
             </a:extLst>
           </p:cNvPr>
@@ -4459,7 +6239,7 @@
         </p:nvSpPr>
         <p:spPr>
           <a:xfrm>
-            <a:off x="3805724" y="848651"/>
+            <a:off x="4085642" y="1363843"/>
             <a:ext cx="3517641" cy="1017037"/>
           </a:xfrm>
           <a:prstGeom prst="rightArrow">
@@ -4487,48 +6267,14 @@
           <a:lstStyle/>
           <a:p>
             <a:pPr algn="ctr"/>
-            <a:r>
-              <a:rPr lang="en-US" dirty="0"/>
-              <a:t>Insert data into the table</a:t>
-            </a:r>
             <a:endParaRPr lang="en-IN" dirty="0"/>
           </a:p>
         </p:txBody>
       </p:sp>
-      <p:pic>
-        <p:nvPicPr>
-          <p:cNvPr id="12" name="Picture 11">
-            <a:extLst>
-              <a:ext uri="{FF2B5EF4-FFF2-40B4-BE49-F238E27FC236}">
-                <a16:creationId xmlns:a16="http://schemas.microsoft.com/office/drawing/2014/main" id="{3197FF63-09F8-D403-0D69-8166D15B90E3}"/>
-              </a:ext>
-            </a:extLst>
-          </p:cNvPr>
-          <p:cNvPicPr>
-            <a:picLocks noChangeAspect="1"/>
-          </p:cNvPicPr>
-          <p:nvPr/>
-        </p:nvPicPr>
-        <p:blipFill>
-          <a:blip r:embed="rId3"/>
-          <a:stretch>
-            <a:fillRect/>
-          </a:stretch>
-        </p:blipFill>
-        <p:spPr>
-          <a:xfrm>
-            <a:off x="7921896" y="790010"/>
-            <a:ext cx="3253845" cy="1122015"/>
-          </a:xfrm>
-          <a:prstGeom prst="rect">
-            <a:avLst/>
-          </a:prstGeom>
-        </p:spPr>
-      </p:pic>
     </p:spTree>
     <p:extLst>
       <p:ext uri="{BB962C8B-B14F-4D97-AF65-F5344CB8AC3E}">
-        <p14:creationId xmlns:p14="http://schemas.microsoft.com/office/powerpoint/2010/main" val="484108989"/>
+        <p14:creationId xmlns:p14="http://schemas.microsoft.com/office/powerpoint/2010/main" val="523028960"/>
       </p:ext>
     </p:extLst>
   </p:cSld>
@@ -4635,65 +6381,6 @@
           </a:p>
         </p:txBody>
       </p:sp>
-      <p:sp>
-        <p:nvSpPr>
-          <p:cNvPr id="10" name="TextBox 9">
-            <a:extLst>
-              <a:ext uri="{FF2B5EF4-FFF2-40B4-BE49-F238E27FC236}">
-                <a16:creationId xmlns:a16="http://schemas.microsoft.com/office/drawing/2014/main" id="{4BD658DA-CDCE-D726-B64D-8C3F7E0479D2}"/>
-              </a:ext>
-            </a:extLst>
-          </p:cNvPr>
-          <p:cNvSpPr txBox="1"/>
-          <p:nvPr/>
-        </p:nvSpPr>
-        <p:spPr>
-          <a:xfrm>
-            <a:off x="7921896" y="2368717"/>
-            <a:ext cx="3631940" cy="1477328"/>
-          </a:xfrm>
-          <a:prstGeom prst="rect">
-            <a:avLst/>
-          </a:prstGeom>
-          <a:noFill/>
-        </p:spPr>
-        <p:txBody>
-          <a:bodyPr wrap="square">
-            <a:spAutoFit/>
-          </a:bodyPr>
-          <a:lstStyle/>
-          <a:p>
-            <a:r>
-              <a:rPr lang="en-IN" dirty="0"/>
-              <a:t>INSERT INTO	</a:t>
-            </a:r>
-          </a:p>
-          <a:p>
-            <a:r>
-              <a:rPr lang="en-IN" dirty="0"/>
-              <a:t>	player (name, age, score)</a:t>
-            </a:r>
-          </a:p>
-          <a:p>
-            <a:r>
-              <a:rPr lang="en-IN" dirty="0"/>
-              <a:t>VALUES	</a:t>
-            </a:r>
-          </a:p>
-          <a:p>
-            <a:r>
-              <a:rPr lang="en-IN" dirty="0"/>
-              <a:t>	("Rakesh", 39, 35),	</a:t>
-            </a:r>
-          </a:p>
-          <a:p>
-            <a:r>
-              <a:rPr lang="en-IN" dirty="0"/>
-              <a:t>	("Sai", 47, 30);	</a:t>
-            </a:r>
-          </a:p>
-        </p:txBody>
-      </p:sp>
       <p:pic>
         <p:nvPicPr>
           <p:cNvPr id="12" name="Picture 11">
@@ -4727,7 +6414,7 @@
     </p:spTree>
     <p:extLst>
       <p:ext uri="{BB962C8B-B14F-4D97-AF65-F5344CB8AC3E}">
-        <p14:creationId xmlns:p14="http://schemas.microsoft.com/office/powerpoint/2010/main" val="495228036"/>
+        <p14:creationId xmlns:p14="http://schemas.microsoft.com/office/powerpoint/2010/main" val="484108989"/>
       </p:ext>
     </p:extLst>
   </p:cSld>
@@ -4756,10 +6443,10 @@
       </p:grpSpPr>
       <p:pic>
         <p:nvPicPr>
-          <p:cNvPr id="3" name="Picture 2">
-            <a:extLst>
-              <a:ext uri="{FF2B5EF4-FFF2-40B4-BE49-F238E27FC236}">
-                <a16:creationId xmlns:a16="http://schemas.microsoft.com/office/drawing/2014/main" id="{23A9669B-9214-05C6-9AF7-E8BEE65E77D7}"/>
+          <p:cNvPr id="5" name="Picture 4">
+            <a:extLst>
+              <a:ext uri="{FF2B5EF4-FFF2-40B4-BE49-F238E27FC236}">
+                <a16:creationId xmlns:a16="http://schemas.microsoft.com/office/drawing/2014/main" id="{9C8AD411-1B79-DCF7-4DE3-6605C3CA9FA1}"/>
               </a:ext>
             </a:extLst>
           </p:cNvPr>
@@ -4776,8 +6463,8 @@
         </p:blipFill>
         <p:spPr>
           <a:xfrm>
-            <a:off x="1032520" y="164174"/>
-            <a:ext cx="2662401" cy="1757184"/>
+            <a:off x="380159" y="1121997"/>
+            <a:ext cx="2978861" cy="470347"/>
           </a:xfrm>
           <a:prstGeom prst="rect">
             <a:avLst/>
@@ -4786,10 +6473,10 @@
       </p:pic>
       <p:sp>
         <p:nvSpPr>
-          <p:cNvPr id="4" name="Arrow: Right 3">
-            <a:extLst>
-              <a:ext uri="{FF2B5EF4-FFF2-40B4-BE49-F238E27FC236}">
-                <a16:creationId xmlns:a16="http://schemas.microsoft.com/office/drawing/2014/main" id="{41A4789A-F467-3DFC-57D0-80B1751AEC4E}"/>
+          <p:cNvPr id="8" name="Arrow: Right 7">
+            <a:extLst>
+              <a:ext uri="{FF2B5EF4-FFF2-40B4-BE49-F238E27FC236}">
+                <a16:creationId xmlns:a16="http://schemas.microsoft.com/office/drawing/2014/main" id="{00E08D3F-64A2-C086-A9EB-035A93012232}"/>
               </a:ext>
             </a:extLst>
           </p:cNvPr>
@@ -4798,7 +6485,7 @@
         </p:nvSpPr>
         <p:spPr>
           <a:xfrm>
-            <a:off x="4337179" y="534248"/>
+            <a:off x="3805724" y="848651"/>
             <a:ext cx="3517641" cy="1017037"/>
           </a:xfrm>
           <a:prstGeom prst="rightArrow">
@@ -4828,18 +6515,77 @@
             <a:pPr algn="ctr"/>
             <a:r>
               <a:rPr lang="en-US" dirty="0"/>
-              <a:t>Select only name and age</a:t>
+              <a:t>Insert data into the table</a:t>
             </a:r>
             <a:endParaRPr lang="en-IN" dirty="0"/>
+          </a:p>
+        </p:txBody>
+      </p:sp>
+      <p:sp>
+        <p:nvSpPr>
+          <p:cNvPr id="10" name="TextBox 9">
+            <a:extLst>
+              <a:ext uri="{FF2B5EF4-FFF2-40B4-BE49-F238E27FC236}">
+                <a16:creationId xmlns:a16="http://schemas.microsoft.com/office/drawing/2014/main" id="{4BD658DA-CDCE-D726-B64D-8C3F7E0479D2}"/>
+              </a:ext>
+            </a:extLst>
+          </p:cNvPr>
+          <p:cNvSpPr txBox="1"/>
+          <p:nvPr/>
+        </p:nvSpPr>
+        <p:spPr>
+          <a:xfrm>
+            <a:off x="7921896" y="2368717"/>
+            <a:ext cx="3631940" cy="1477328"/>
+          </a:xfrm>
+          <a:prstGeom prst="rect">
+            <a:avLst/>
+          </a:prstGeom>
+          <a:noFill/>
+        </p:spPr>
+        <p:txBody>
+          <a:bodyPr wrap="square">
+            <a:spAutoFit/>
+          </a:bodyPr>
+          <a:lstStyle/>
+          <a:p>
+            <a:r>
+              <a:rPr lang="en-IN" dirty="0"/>
+              <a:t>INSERT INTO	</a:t>
+            </a:r>
+          </a:p>
+          <a:p>
+            <a:r>
+              <a:rPr lang="en-IN" dirty="0"/>
+              <a:t>	player (name, age, score)</a:t>
+            </a:r>
+          </a:p>
+          <a:p>
+            <a:r>
+              <a:rPr lang="en-IN" dirty="0"/>
+              <a:t>VALUES	</a:t>
+            </a:r>
+          </a:p>
+          <a:p>
+            <a:r>
+              <a:rPr lang="en-IN" dirty="0"/>
+              <a:t>	("Rakesh", 39, 35),	</a:t>
+            </a:r>
+          </a:p>
+          <a:p>
+            <a:r>
+              <a:rPr lang="en-IN" dirty="0"/>
+              <a:t>	("Sai", 47, 30);	</a:t>
+            </a:r>
           </a:p>
         </p:txBody>
       </p:sp>
       <p:pic>
         <p:nvPicPr>
-          <p:cNvPr id="8" name="Picture 7">
-            <a:extLst>
-              <a:ext uri="{FF2B5EF4-FFF2-40B4-BE49-F238E27FC236}">
-                <a16:creationId xmlns:a16="http://schemas.microsoft.com/office/drawing/2014/main" id="{CF62EBB2-1A45-79BB-986E-0D48DF00A112}"/>
+          <p:cNvPr id="12" name="Picture 11">
+            <a:extLst>
+              <a:ext uri="{FF2B5EF4-FFF2-40B4-BE49-F238E27FC236}">
+                <a16:creationId xmlns:a16="http://schemas.microsoft.com/office/drawing/2014/main" id="{3197FF63-09F8-D403-0D69-8166D15B90E3}"/>
               </a:ext>
             </a:extLst>
           </p:cNvPr>
@@ -4856,136 +6602,18 @@
         </p:blipFill>
         <p:spPr>
           <a:xfrm>
-            <a:off x="8282501" y="164174"/>
-            <a:ext cx="1943850" cy="1699259"/>
+            <a:off x="7921896" y="790010"/>
+            <a:ext cx="3253845" cy="1122015"/>
           </a:xfrm>
           <a:prstGeom prst="rect">
             <a:avLst/>
           </a:prstGeom>
         </p:spPr>
       </p:pic>
-      <p:pic>
-        <p:nvPicPr>
-          <p:cNvPr id="12" name="Picture 11">
-            <a:extLst>
-              <a:ext uri="{FF2B5EF4-FFF2-40B4-BE49-F238E27FC236}">
-                <a16:creationId xmlns:a16="http://schemas.microsoft.com/office/drawing/2014/main" id="{02E53C69-840B-FD4A-241F-50BC561D0334}"/>
-              </a:ext>
-            </a:extLst>
-          </p:cNvPr>
-          <p:cNvPicPr>
-            <a:picLocks noChangeAspect="1"/>
-          </p:cNvPicPr>
-          <p:nvPr/>
-        </p:nvPicPr>
-        <p:blipFill>
-          <a:blip r:embed="rId4"/>
-          <a:stretch>
-            <a:fillRect/>
-          </a:stretch>
-        </p:blipFill>
-        <p:spPr>
-          <a:xfrm>
-            <a:off x="1331195" y="5131430"/>
-            <a:ext cx="1794560" cy="606983"/>
-          </a:xfrm>
-          <a:prstGeom prst="rect">
-            <a:avLst/>
-          </a:prstGeom>
-        </p:spPr>
-      </p:pic>
-      <p:sp>
-        <p:nvSpPr>
-          <p:cNvPr id="13" name="Arrow: Down 12">
-            <a:extLst>
-              <a:ext uri="{FF2B5EF4-FFF2-40B4-BE49-F238E27FC236}">
-                <a16:creationId xmlns:a16="http://schemas.microsoft.com/office/drawing/2014/main" id="{1870D57E-59B7-C772-8380-522415114DB3}"/>
-              </a:ext>
-            </a:extLst>
-          </p:cNvPr>
-          <p:cNvSpPr/>
-          <p:nvPr/>
-        </p:nvSpPr>
-        <p:spPr>
-          <a:xfrm>
-            <a:off x="1761944" y="2798010"/>
-            <a:ext cx="933062" cy="1922106"/>
-          </a:xfrm>
-          <a:prstGeom prst="downArrow">
-            <a:avLst/>
-          </a:prstGeom>
-        </p:spPr>
-        <p:style>
-          <a:lnRef idx="2">
-            <a:schemeClr val="accent1">
-              <a:shade val="15000"/>
-            </a:schemeClr>
-          </a:lnRef>
-          <a:fillRef idx="1">
-            <a:schemeClr val="accent1"/>
-          </a:fillRef>
-          <a:effectRef idx="0">
-            <a:schemeClr val="accent1"/>
-          </a:effectRef>
-          <a:fontRef idx="minor">
-            <a:schemeClr val="lt1"/>
-          </a:fontRef>
-        </p:style>
-        <p:txBody>
-          <a:bodyPr rtlCol="0" anchor="ctr"/>
-          <a:lstStyle/>
-          <a:p>
-            <a:pPr algn="ctr"/>
-            <a:endParaRPr lang="en-IN" dirty="0"/>
-          </a:p>
-        </p:txBody>
-      </p:sp>
-      <p:sp>
-        <p:nvSpPr>
-          <p:cNvPr id="15" name="TextBox 14">
-            <a:extLst>
-              <a:ext uri="{FF2B5EF4-FFF2-40B4-BE49-F238E27FC236}">
-                <a16:creationId xmlns:a16="http://schemas.microsoft.com/office/drawing/2014/main" id="{E3812E9A-B41D-7449-60DF-FD3FB8EAEC6F}"/>
-              </a:ext>
-            </a:extLst>
-          </p:cNvPr>
-          <p:cNvSpPr txBox="1"/>
-          <p:nvPr/>
-        </p:nvSpPr>
-        <p:spPr>
-          <a:xfrm>
-            <a:off x="2538991" y="2781221"/>
-            <a:ext cx="2132113" cy="1200329"/>
-          </a:xfrm>
-          <a:prstGeom prst="rect">
-            <a:avLst/>
-          </a:prstGeom>
-          <a:noFill/>
-        </p:spPr>
-        <p:txBody>
-          <a:bodyPr wrap="square" rtlCol="0">
-            <a:spAutoFit/>
-          </a:bodyPr>
-          <a:lstStyle/>
-          <a:p>
-            <a:r>
-              <a:rPr lang="en-US" dirty="0"/>
-              <a:t>Select name, age from </a:t>
-            </a:r>
-          </a:p>
-          <a:p>
-            <a:r>
-              <a:rPr lang="en-US" dirty="0"/>
-              <a:t>Player table whose name is “Sai”</a:t>
-            </a:r>
-            <a:endParaRPr lang="en-IN" dirty="0"/>
-          </a:p>
-        </p:txBody>
-      </p:sp>
     </p:spTree>
     <p:extLst>
       <p:ext uri="{BB962C8B-B14F-4D97-AF65-F5344CB8AC3E}">
-        <p14:creationId xmlns:p14="http://schemas.microsoft.com/office/powerpoint/2010/main" val="2807531647"/>
+        <p14:creationId xmlns:p14="http://schemas.microsoft.com/office/powerpoint/2010/main" val="495228036"/>
       </p:ext>
     </p:extLst>
   </p:cSld>
@@ -5092,41 +6720,6 @@
           </a:p>
         </p:txBody>
       </p:sp>
-      <p:sp>
-        <p:nvSpPr>
-          <p:cNvPr id="6" name="TextBox 5">
-            <a:extLst>
-              <a:ext uri="{FF2B5EF4-FFF2-40B4-BE49-F238E27FC236}">
-                <a16:creationId xmlns:a16="http://schemas.microsoft.com/office/drawing/2014/main" id="{A4F2C872-E381-9453-48D8-ED0AF7476960}"/>
-              </a:ext>
-            </a:extLst>
-          </p:cNvPr>
-          <p:cNvSpPr txBox="1"/>
-          <p:nvPr/>
-        </p:nvSpPr>
-        <p:spPr>
-          <a:xfrm>
-            <a:off x="993642" y="2059346"/>
-            <a:ext cx="2132113" cy="369332"/>
-          </a:xfrm>
-          <a:prstGeom prst="rect">
-            <a:avLst/>
-          </a:prstGeom>
-          <a:noFill/>
-        </p:spPr>
-        <p:txBody>
-          <a:bodyPr wrap="square">
-            <a:spAutoFit/>
-          </a:bodyPr>
-          <a:lstStyle/>
-          <a:p>
-            <a:r>
-              <a:rPr lang="en-IN" dirty="0"/>
-              <a:t>select * from player;</a:t>
-            </a:r>
-          </a:p>
-        </p:txBody>
-      </p:sp>
       <p:pic>
         <p:nvPicPr>
           <p:cNvPr id="8" name="Picture 7">
@@ -5157,65 +6750,6 @@
           </a:prstGeom>
         </p:spPr>
       </p:pic>
-      <p:sp>
-        <p:nvSpPr>
-          <p:cNvPr id="10" name="TextBox 9">
-            <a:extLst>
-              <a:ext uri="{FF2B5EF4-FFF2-40B4-BE49-F238E27FC236}">
-                <a16:creationId xmlns:a16="http://schemas.microsoft.com/office/drawing/2014/main" id="{89CBEDC9-1699-9925-4578-A072DE09B9B4}"/>
-              </a:ext>
-            </a:extLst>
-          </p:cNvPr>
-          <p:cNvSpPr txBox="1"/>
-          <p:nvPr/>
-        </p:nvSpPr>
-        <p:spPr>
-          <a:xfrm>
-            <a:off x="8348566" y="2059346"/>
-            <a:ext cx="1971091" cy="1477328"/>
-          </a:xfrm>
-          <a:prstGeom prst="rect">
-            <a:avLst/>
-          </a:prstGeom>
-          <a:noFill/>
-        </p:spPr>
-        <p:txBody>
-          <a:bodyPr wrap="square">
-            <a:spAutoFit/>
-          </a:bodyPr>
-          <a:lstStyle/>
-          <a:p>
-            <a:r>
-              <a:rPr lang="en-IN" dirty="0"/>
-              <a:t>select 	</a:t>
-            </a:r>
-          </a:p>
-          <a:p>
-            <a:r>
-              <a:rPr lang="en-IN" dirty="0"/>
-              <a:t>	name,    </a:t>
-            </a:r>
-          </a:p>
-          <a:p>
-            <a:r>
-              <a:rPr lang="en-IN" dirty="0"/>
-              <a:t>	age</a:t>
-            </a:r>
-          </a:p>
-          <a:p>
-            <a:r>
-              <a:rPr lang="en-IN" dirty="0"/>
-              <a:t>from 	</a:t>
-            </a:r>
-          </a:p>
-          <a:p>
-            <a:r>
-              <a:rPr lang="en-IN" dirty="0"/>
-              <a:t>	player;</a:t>
-            </a:r>
-          </a:p>
-        </p:txBody>
-      </p:sp>
       <p:pic>
         <p:nvPicPr>
           <p:cNvPr id="12" name="Picture 11">
@@ -5334,75 +6868,10 @@
           </a:p>
         </p:txBody>
       </p:sp>
-      <p:sp>
-        <p:nvSpPr>
-          <p:cNvPr id="17" name="TextBox 16">
-            <a:extLst>
-              <a:ext uri="{FF2B5EF4-FFF2-40B4-BE49-F238E27FC236}">
-                <a16:creationId xmlns:a16="http://schemas.microsoft.com/office/drawing/2014/main" id="{DE94B763-A763-F743-1C8C-5E604222FE1D}"/>
-              </a:ext>
-            </a:extLst>
-          </p:cNvPr>
-          <p:cNvSpPr txBox="1"/>
-          <p:nvPr/>
-        </p:nvSpPr>
-        <p:spPr>
-          <a:xfrm>
-            <a:off x="3236557" y="4841413"/>
-            <a:ext cx="6097554" cy="1754326"/>
-          </a:xfrm>
-          <a:prstGeom prst="rect">
-            <a:avLst/>
-          </a:prstGeom>
-          <a:noFill/>
-        </p:spPr>
-        <p:txBody>
-          <a:bodyPr wrap="square">
-            <a:spAutoFit/>
-          </a:bodyPr>
-          <a:lstStyle/>
-          <a:p>
-            <a:r>
-              <a:rPr lang="en-IN" dirty="0"/>
-              <a:t>select 	</a:t>
-            </a:r>
-          </a:p>
-          <a:p>
-            <a:r>
-              <a:rPr lang="en-IN" dirty="0"/>
-              <a:t>	name, age</a:t>
-            </a:r>
-          </a:p>
-          <a:p>
-            <a:r>
-              <a:rPr lang="en-IN" dirty="0"/>
-              <a:t>from 	</a:t>
-            </a:r>
-          </a:p>
-          <a:p>
-            <a:r>
-              <a:rPr lang="en-IN" dirty="0"/>
-              <a:t>	player</a:t>
-            </a:r>
-          </a:p>
-          <a:p>
-            <a:r>
-              <a:rPr lang="en-IN" dirty="0"/>
-              <a:t>where 	</a:t>
-            </a:r>
-          </a:p>
-          <a:p>
-            <a:r>
-              <a:rPr lang="en-IN" dirty="0"/>
-              <a:t>	name = “Sai"</a:t>
-            </a:r>
-          </a:p>
-        </p:txBody>
-      </p:sp>
     </p:spTree>
     <p:extLst>
       <p:ext uri="{BB962C8B-B14F-4D97-AF65-F5344CB8AC3E}">
-        <p14:creationId xmlns:p14="http://schemas.microsoft.com/office/powerpoint/2010/main" val="2171306974"/>
+        <p14:creationId xmlns:p14="http://schemas.microsoft.com/office/powerpoint/2010/main" val="2807531647"/>
       </p:ext>
     </p:extLst>
   </p:cSld>
@@ -5431,10 +6900,10 @@
       </p:grpSpPr>
       <p:pic>
         <p:nvPicPr>
-          <p:cNvPr id="2" name="Picture 1">
-            <a:extLst>
-              <a:ext uri="{FF2B5EF4-FFF2-40B4-BE49-F238E27FC236}">
-                <a16:creationId xmlns:a16="http://schemas.microsoft.com/office/drawing/2014/main" id="{6EBB2198-A52D-7CFB-4C07-E6BFE9CFABBA}"/>
+          <p:cNvPr id="3" name="Picture 2">
+            <a:extLst>
+              <a:ext uri="{FF2B5EF4-FFF2-40B4-BE49-F238E27FC236}">
+                <a16:creationId xmlns:a16="http://schemas.microsoft.com/office/drawing/2014/main" id="{23A9669B-9214-05C6-9AF7-E8BEE65E77D7}"/>
               </a:ext>
             </a:extLst>
           </p:cNvPr>
@@ -5464,7 +6933,7 @@
           <p:cNvPr id="4" name="Arrow: Right 3">
             <a:extLst>
               <a:ext uri="{FF2B5EF4-FFF2-40B4-BE49-F238E27FC236}">
-                <a16:creationId xmlns:a16="http://schemas.microsoft.com/office/drawing/2014/main" id="{D438B38F-1820-F21A-236D-BC4A31CBDAAF}"/>
+                <a16:creationId xmlns:a16="http://schemas.microsoft.com/office/drawing/2014/main" id="{41A4789A-F467-3DFC-57D0-80B1751AEC4E}"/>
               </a:ext>
             </a:extLst>
           </p:cNvPr>
@@ -5503,9 +6972,44 @@
             <a:pPr algn="ctr"/>
             <a:r>
               <a:rPr lang="en-US" dirty="0"/>
-              <a:t>Update score of Ram to 100</a:t>
+              <a:t>Select only name and age</a:t>
             </a:r>
             <a:endParaRPr lang="en-IN" dirty="0"/>
+          </a:p>
+        </p:txBody>
+      </p:sp>
+      <p:sp>
+        <p:nvSpPr>
+          <p:cNvPr id="6" name="TextBox 5">
+            <a:extLst>
+              <a:ext uri="{FF2B5EF4-FFF2-40B4-BE49-F238E27FC236}">
+                <a16:creationId xmlns:a16="http://schemas.microsoft.com/office/drawing/2014/main" id="{A4F2C872-E381-9453-48D8-ED0AF7476960}"/>
+              </a:ext>
+            </a:extLst>
+          </p:cNvPr>
+          <p:cNvSpPr txBox="1"/>
+          <p:nvPr/>
+        </p:nvSpPr>
+        <p:spPr>
+          <a:xfrm>
+            <a:off x="993642" y="2059346"/>
+            <a:ext cx="2132113" cy="369332"/>
+          </a:xfrm>
+          <a:prstGeom prst="rect">
+            <a:avLst/>
+          </a:prstGeom>
+          <a:noFill/>
+        </p:spPr>
+        <p:txBody>
+          <a:bodyPr wrap="square">
+            <a:spAutoFit/>
+          </a:bodyPr>
+          <a:lstStyle/>
+          <a:p>
+            <a:r>
+              <a:rPr lang="en-IN" dirty="0"/>
+              <a:t>select * from player;</a:t>
+            </a:r>
           </a:p>
         </p:txBody>
       </p:sp>
@@ -5514,7 +7018,7 @@
           <p:cNvPr id="8" name="Picture 7">
             <a:extLst>
               <a:ext uri="{FF2B5EF4-FFF2-40B4-BE49-F238E27FC236}">
-                <a16:creationId xmlns:a16="http://schemas.microsoft.com/office/drawing/2014/main" id="{549308D5-5C91-D663-BC48-7BA4043E580C}"/>
+                <a16:creationId xmlns:a16="http://schemas.microsoft.com/office/drawing/2014/main" id="{CF62EBB2-1A45-79BB-986E-0D48DF00A112}"/>
               </a:ext>
             </a:extLst>
           </p:cNvPr>
@@ -5531,18 +7035,260 @@
         </p:blipFill>
         <p:spPr>
           <a:xfrm>
-            <a:off x="8385889" y="164174"/>
-            <a:ext cx="2426196" cy="1754326"/>
+            <a:off x="8282501" y="164174"/>
+            <a:ext cx="1943850" cy="1699259"/>
           </a:xfrm>
           <a:prstGeom prst="rect">
             <a:avLst/>
           </a:prstGeom>
         </p:spPr>
       </p:pic>
+      <p:sp>
+        <p:nvSpPr>
+          <p:cNvPr id="10" name="TextBox 9">
+            <a:extLst>
+              <a:ext uri="{FF2B5EF4-FFF2-40B4-BE49-F238E27FC236}">
+                <a16:creationId xmlns:a16="http://schemas.microsoft.com/office/drawing/2014/main" id="{89CBEDC9-1699-9925-4578-A072DE09B9B4}"/>
+              </a:ext>
+            </a:extLst>
+          </p:cNvPr>
+          <p:cNvSpPr txBox="1"/>
+          <p:nvPr/>
+        </p:nvSpPr>
+        <p:spPr>
+          <a:xfrm>
+            <a:off x="8348566" y="2059346"/>
+            <a:ext cx="1971091" cy="1477328"/>
+          </a:xfrm>
+          <a:prstGeom prst="rect">
+            <a:avLst/>
+          </a:prstGeom>
+          <a:noFill/>
+        </p:spPr>
+        <p:txBody>
+          <a:bodyPr wrap="square">
+            <a:spAutoFit/>
+          </a:bodyPr>
+          <a:lstStyle/>
+          <a:p>
+            <a:r>
+              <a:rPr lang="en-IN" dirty="0"/>
+              <a:t>select 	</a:t>
+            </a:r>
+          </a:p>
+          <a:p>
+            <a:r>
+              <a:rPr lang="en-IN" dirty="0"/>
+              <a:t>	name,    </a:t>
+            </a:r>
+          </a:p>
+          <a:p>
+            <a:r>
+              <a:rPr lang="en-IN" dirty="0"/>
+              <a:t>	age</a:t>
+            </a:r>
+          </a:p>
+          <a:p>
+            <a:r>
+              <a:rPr lang="en-IN" dirty="0"/>
+              <a:t>from 	</a:t>
+            </a:r>
+          </a:p>
+          <a:p>
+            <a:r>
+              <a:rPr lang="en-IN" dirty="0"/>
+              <a:t>	player;</a:t>
+            </a:r>
+          </a:p>
+        </p:txBody>
+      </p:sp>
+      <p:pic>
+        <p:nvPicPr>
+          <p:cNvPr id="12" name="Picture 11">
+            <a:extLst>
+              <a:ext uri="{FF2B5EF4-FFF2-40B4-BE49-F238E27FC236}">
+                <a16:creationId xmlns:a16="http://schemas.microsoft.com/office/drawing/2014/main" id="{02E53C69-840B-FD4A-241F-50BC561D0334}"/>
+              </a:ext>
+            </a:extLst>
+          </p:cNvPr>
+          <p:cNvPicPr>
+            <a:picLocks noChangeAspect="1"/>
+          </p:cNvPicPr>
+          <p:nvPr/>
+        </p:nvPicPr>
+        <p:blipFill>
+          <a:blip r:embed="rId4"/>
+          <a:stretch>
+            <a:fillRect/>
+          </a:stretch>
+        </p:blipFill>
+        <p:spPr>
+          <a:xfrm>
+            <a:off x="1331195" y="5131430"/>
+            <a:ext cx="1794560" cy="606983"/>
+          </a:xfrm>
+          <a:prstGeom prst="rect">
+            <a:avLst/>
+          </a:prstGeom>
+        </p:spPr>
+      </p:pic>
+      <p:sp>
+        <p:nvSpPr>
+          <p:cNvPr id="13" name="Arrow: Down 12">
+            <a:extLst>
+              <a:ext uri="{FF2B5EF4-FFF2-40B4-BE49-F238E27FC236}">
+                <a16:creationId xmlns:a16="http://schemas.microsoft.com/office/drawing/2014/main" id="{1870D57E-59B7-C772-8380-522415114DB3}"/>
+              </a:ext>
+            </a:extLst>
+          </p:cNvPr>
+          <p:cNvSpPr/>
+          <p:nvPr/>
+        </p:nvSpPr>
+        <p:spPr>
+          <a:xfrm>
+            <a:off x="1761944" y="2798010"/>
+            <a:ext cx="933062" cy="1922106"/>
+          </a:xfrm>
+          <a:prstGeom prst="downArrow">
+            <a:avLst/>
+          </a:prstGeom>
+        </p:spPr>
+        <p:style>
+          <a:lnRef idx="2">
+            <a:schemeClr val="accent1">
+              <a:shade val="15000"/>
+            </a:schemeClr>
+          </a:lnRef>
+          <a:fillRef idx="1">
+            <a:schemeClr val="accent1"/>
+          </a:fillRef>
+          <a:effectRef idx="0">
+            <a:schemeClr val="accent1"/>
+          </a:effectRef>
+          <a:fontRef idx="minor">
+            <a:schemeClr val="lt1"/>
+          </a:fontRef>
+        </p:style>
+        <p:txBody>
+          <a:bodyPr rtlCol="0" anchor="ctr"/>
+          <a:lstStyle/>
+          <a:p>
+            <a:pPr algn="ctr"/>
+            <a:endParaRPr lang="en-IN" dirty="0"/>
+          </a:p>
+        </p:txBody>
+      </p:sp>
+      <p:sp>
+        <p:nvSpPr>
+          <p:cNvPr id="15" name="TextBox 14">
+            <a:extLst>
+              <a:ext uri="{FF2B5EF4-FFF2-40B4-BE49-F238E27FC236}">
+                <a16:creationId xmlns:a16="http://schemas.microsoft.com/office/drawing/2014/main" id="{E3812E9A-B41D-7449-60DF-FD3FB8EAEC6F}"/>
+              </a:ext>
+            </a:extLst>
+          </p:cNvPr>
+          <p:cNvSpPr txBox="1"/>
+          <p:nvPr/>
+        </p:nvSpPr>
+        <p:spPr>
+          <a:xfrm>
+            <a:off x="2538991" y="2781221"/>
+            <a:ext cx="2132113" cy="1200329"/>
+          </a:xfrm>
+          <a:prstGeom prst="rect">
+            <a:avLst/>
+          </a:prstGeom>
+          <a:noFill/>
+        </p:spPr>
+        <p:txBody>
+          <a:bodyPr wrap="square" rtlCol="0">
+            <a:spAutoFit/>
+          </a:bodyPr>
+          <a:lstStyle/>
+          <a:p>
+            <a:r>
+              <a:rPr lang="en-US" dirty="0"/>
+              <a:t>Select name, age from </a:t>
+            </a:r>
+          </a:p>
+          <a:p>
+            <a:r>
+              <a:rPr lang="en-US" dirty="0"/>
+              <a:t>Player table whose name is “Sai”</a:t>
+            </a:r>
+            <a:endParaRPr lang="en-IN" dirty="0"/>
+          </a:p>
+        </p:txBody>
+      </p:sp>
+      <p:sp>
+        <p:nvSpPr>
+          <p:cNvPr id="17" name="TextBox 16">
+            <a:extLst>
+              <a:ext uri="{FF2B5EF4-FFF2-40B4-BE49-F238E27FC236}">
+                <a16:creationId xmlns:a16="http://schemas.microsoft.com/office/drawing/2014/main" id="{DE94B763-A763-F743-1C8C-5E604222FE1D}"/>
+              </a:ext>
+            </a:extLst>
+          </p:cNvPr>
+          <p:cNvSpPr txBox="1"/>
+          <p:nvPr/>
+        </p:nvSpPr>
+        <p:spPr>
+          <a:xfrm>
+            <a:off x="3236557" y="4841413"/>
+            <a:ext cx="6097554" cy="1754326"/>
+          </a:xfrm>
+          <a:prstGeom prst="rect">
+            <a:avLst/>
+          </a:prstGeom>
+          <a:noFill/>
+        </p:spPr>
+        <p:txBody>
+          <a:bodyPr wrap="square">
+            <a:spAutoFit/>
+          </a:bodyPr>
+          <a:lstStyle/>
+          <a:p>
+            <a:r>
+              <a:rPr lang="en-IN" dirty="0"/>
+              <a:t>select 	</a:t>
+            </a:r>
+          </a:p>
+          <a:p>
+            <a:r>
+              <a:rPr lang="en-IN" dirty="0"/>
+              <a:t>	name, age</a:t>
+            </a:r>
+          </a:p>
+          <a:p>
+            <a:r>
+              <a:rPr lang="en-IN" dirty="0"/>
+              <a:t>from 	</a:t>
+            </a:r>
+          </a:p>
+          <a:p>
+            <a:r>
+              <a:rPr lang="en-IN" dirty="0"/>
+              <a:t>	player</a:t>
+            </a:r>
+          </a:p>
+          <a:p>
+            <a:r>
+              <a:rPr lang="en-IN" dirty="0"/>
+              <a:t>where 	</a:t>
+            </a:r>
+          </a:p>
+          <a:p>
+            <a:r>
+              <a:rPr lang="en-IN" dirty="0"/>
+              <a:t>	name = “Sai"</a:t>
+            </a:r>
+          </a:p>
+        </p:txBody>
+      </p:sp>
     </p:spTree>
     <p:extLst>
       <p:ext uri="{BB962C8B-B14F-4D97-AF65-F5344CB8AC3E}">
-        <p14:creationId xmlns:p14="http://schemas.microsoft.com/office/powerpoint/2010/main" val="1555591143"/>
+        <p14:creationId xmlns:p14="http://schemas.microsoft.com/office/powerpoint/2010/main" val="2171306974"/>
       </p:ext>
     </p:extLst>
   </p:cSld>
@@ -5649,71 +7395,6 @@
           </a:p>
         </p:txBody>
       </p:sp>
-      <p:sp>
-        <p:nvSpPr>
-          <p:cNvPr id="6" name="TextBox 5">
-            <a:extLst>
-              <a:ext uri="{FF2B5EF4-FFF2-40B4-BE49-F238E27FC236}">
-                <a16:creationId xmlns:a16="http://schemas.microsoft.com/office/drawing/2014/main" id="{4350547D-2C8E-20C6-B656-83B19E84F9CC}"/>
-              </a:ext>
-            </a:extLst>
-          </p:cNvPr>
-          <p:cNvSpPr txBox="1"/>
-          <p:nvPr/>
-        </p:nvSpPr>
-        <p:spPr>
-          <a:xfrm>
-            <a:off x="8385889" y="2266080"/>
-            <a:ext cx="2586912" cy="1754326"/>
-          </a:xfrm>
-          <a:prstGeom prst="rect">
-            <a:avLst/>
-          </a:prstGeom>
-          <a:noFill/>
-        </p:spPr>
-        <p:txBody>
-          <a:bodyPr wrap="square">
-            <a:spAutoFit/>
-          </a:bodyPr>
-          <a:lstStyle/>
-          <a:p>
-            <a:r>
-              <a:rPr lang="en-IN" dirty="0"/>
-              <a:t>update 	</a:t>
-            </a:r>
-          </a:p>
-          <a:p>
-            <a:r>
-              <a:rPr lang="en-IN" dirty="0"/>
-              <a:t>	player </a:t>
-            </a:r>
-          </a:p>
-          <a:p>
-            <a:r>
-              <a:rPr lang="en-IN" dirty="0"/>
-              <a:t>set 	</a:t>
-            </a:r>
-          </a:p>
-          <a:p>
-            <a:r>
-              <a:rPr lang="en-IN" dirty="0"/>
-              <a:t>	score = 100</a:t>
-            </a:r>
-          </a:p>
-          <a:p>
-            <a:r>
-              <a:rPr lang="en-IN" dirty="0"/>
-              <a:t>WHERE 	</a:t>
-            </a:r>
-          </a:p>
-          <a:p>
-            <a:r>
-              <a:rPr lang="en-IN" dirty="0"/>
-              <a:t>	name = "Ram"; </a:t>
-            </a:r>
-          </a:p>
-        </p:txBody>
-      </p:sp>
       <p:pic>
         <p:nvPicPr>
           <p:cNvPr id="8" name="Picture 7">
@@ -5747,7 +7428,7 @@
     </p:spTree>
     <p:extLst>
       <p:ext uri="{BB962C8B-B14F-4D97-AF65-F5344CB8AC3E}">
-        <p14:creationId xmlns:p14="http://schemas.microsoft.com/office/powerpoint/2010/main" val="25921766"/>
+        <p14:creationId xmlns:p14="http://schemas.microsoft.com/office/powerpoint/2010/main" val="1555591143"/>
       </p:ext>
     </p:extLst>
   </p:cSld>

</xml_diff>